<commit_message>
Add experimental results, start making alterations to presentation of addToCover and updateIncompatible
</commit_message>
<xml_diff>
--- a/interim_report/images/graphs.pptx
+++ b/interim_report/images/graphs.pptx
@@ -209,7 +209,7 @@
           <a:p>
             <a:fld id="{5ADE0F42-1EB1-C14E-B881-EB65E9D225AC}" type="datetimeFigureOut">
               <a:rPr lang="en-US" smtClean="0"/>
-              <a:t>3/20/19</a:t>
+              <a:t>4/1/19</a:t>
             </a:fld>
             <a:endParaRPr lang="en-US"/>
           </a:p>
@@ -532,11 +532,7 @@
             </a:r>
             <a:r>
               <a:rPr lang="en-US" baseline="0" dirty="0" smtClean="0"/>
-              <a:t> </a:t>
-            </a:r>
-            <a:r>
-              <a:rPr lang="en-US" baseline="0" dirty="0" smtClean="0"/>
-              <a:t>difference</a:t>
+              <a:t> difference</a:t>
             </a:r>
             <a:endParaRPr lang="en-US" dirty="0"/>
           </a:p>
@@ -1000,11 +996,7 @@
           <a:p>
             <a:r>
               <a:rPr lang="en-US" dirty="0" smtClean="0"/>
-              <a:t>Centroid </a:t>
-            </a:r>
-            <a:r>
-              <a:rPr lang="en-US" dirty="0" smtClean="0"/>
-              <a:t>path</a:t>
+              <a:t>Centroid path</a:t>
             </a:r>
             <a:endParaRPr lang="en-US" dirty="0"/>
           </a:p>
@@ -1379,11 +1371,7 @@
           <a:p>
             <a:r>
               <a:rPr lang="en-US" dirty="0" smtClean="0"/>
-              <a:t>Label </a:t>
-            </a:r>
-            <a:r>
-              <a:rPr lang="en-US" dirty="0" smtClean="0"/>
-              <a:t>Clusters</a:t>
+              <a:t>Label Clusters</a:t>
             </a:r>
             <a:endParaRPr lang="en-US" dirty="0"/>
           </a:p>
@@ -1830,7 +1818,7 @@
           <a:p>
             <a:fld id="{75DCEA96-0148-464D-8045-BBEB0C835C6A}" type="datetimeFigureOut">
               <a:rPr lang="en-US" smtClean="0"/>
-              <a:t>3/20/19</a:t>
+              <a:t>4/1/19</a:t>
             </a:fld>
             <a:endParaRPr lang="en-US"/>
           </a:p>
@@ -1995,7 +1983,7 @@
           <a:p>
             <a:fld id="{75DCEA96-0148-464D-8045-BBEB0C835C6A}" type="datetimeFigureOut">
               <a:rPr lang="en-US" smtClean="0"/>
-              <a:t>3/20/19</a:t>
+              <a:t>4/1/19</a:t>
             </a:fld>
             <a:endParaRPr lang="en-US"/>
           </a:p>
@@ -2170,7 +2158,7 @@
           <a:p>
             <a:fld id="{75DCEA96-0148-464D-8045-BBEB0C835C6A}" type="datetimeFigureOut">
               <a:rPr lang="en-US" smtClean="0"/>
-              <a:t>3/20/19</a:t>
+              <a:t>4/1/19</a:t>
             </a:fld>
             <a:endParaRPr lang="en-US"/>
           </a:p>
@@ -2335,7 +2323,7 @@
           <a:p>
             <a:fld id="{75DCEA96-0148-464D-8045-BBEB0C835C6A}" type="datetimeFigureOut">
               <a:rPr lang="en-US" smtClean="0"/>
-              <a:t>3/20/19</a:t>
+              <a:t>4/1/19</a:t>
             </a:fld>
             <a:endParaRPr lang="en-US"/>
           </a:p>
@@ -2576,7 +2564,7 @@
           <a:p>
             <a:fld id="{75DCEA96-0148-464D-8045-BBEB0C835C6A}" type="datetimeFigureOut">
               <a:rPr lang="en-US" smtClean="0"/>
-              <a:t>3/20/19</a:t>
+              <a:t>4/1/19</a:t>
             </a:fld>
             <a:endParaRPr lang="en-US"/>
           </a:p>
@@ -2803,7 +2791,7 @@
           <a:p>
             <a:fld id="{75DCEA96-0148-464D-8045-BBEB0C835C6A}" type="datetimeFigureOut">
               <a:rPr lang="en-US" smtClean="0"/>
-              <a:t>3/20/19</a:t>
+              <a:t>4/1/19</a:t>
             </a:fld>
             <a:endParaRPr lang="en-US"/>
           </a:p>
@@ -3165,7 +3153,7 @@
           <a:p>
             <a:fld id="{75DCEA96-0148-464D-8045-BBEB0C835C6A}" type="datetimeFigureOut">
               <a:rPr lang="en-US" smtClean="0"/>
-              <a:t>3/20/19</a:t>
+              <a:t>4/1/19</a:t>
             </a:fld>
             <a:endParaRPr lang="en-US"/>
           </a:p>
@@ -3278,7 +3266,7 @@
           <a:p>
             <a:fld id="{75DCEA96-0148-464D-8045-BBEB0C835C6A}" type="datetimeFigureOut">
               <a:rPr lang="en-US" smtClean="0"/>
-              <a:t>3/20/19</a:t>
+              <a:t>4/1/19</a:t>
             </a:fld>
             <a:endParaRPr lang="en-US"/>
           </a:p>
@@ -3368,7 +3356,7 @@
           <a:p>
             <a:fld id="{75DCEA96-0148-464D-8045-BBEB0C835C6A}" type="datetimeFigureOut">
               <a:rPr lang="en-US" smtClean="0"/>
-              <a:t>3/20/19</a:t>
+              <a:t>4/1/19</a:t>
             </a:fld>
             <a:endParaRPr lang="en-US"/>
           </a:p>
@@ -3640,7 +3628,7 @@
           <a:p>
             <a:fld id="{75DCEA96-0148-464D-8045-BBEB0C835C6A}" type="datetimeFigureOut">
               <a:rPr lang="en-US" smtClean="0"/>
-              <a:t>3/20/19</a:t>
+              <a:t>4/1/19</a:t>
             </a:fld>
             <a:endParaRPr lang="en-US"/>
           </a:p>
@@ -3892,7 +3880,7 @@
           <a:p>
             <a:fld id="{75DCEA96-0148-464D-8045-BBEB0C835C6A}" type="datetimeFigureOut">
               <a:rPr lang="en-US" smtClean="0"/>
-              <a:t>3/20/19</a:t>
+              <a:t>4/1/19</a:t>
             </a:fld>
             <a:endParaRPr lang="en-US"/>
           </a:p>
@@ -4100,7 +4088,7 @@
           <a:p>
             <a:fld id="{75DCEA96-0148-464D-8045-BBEB0C835C6A}" type="datetimeFigureOut">
               <a:rPr lang="en-US" smtClean="0"/>
-              <a:t>3/20/19</a:t>
+              <a:t>4/1/19</a:t>
             </a:fld>
             <a:endParaRPr lang="en-US"/>
           </a:p>
@@ -12261,8 +12249,8 @@
           </a:p>
         </p:txBody>
       </p:sp>
-      <mc:AlternateContent xmlns:mc="http://schemas.openxmlformats.org/markup-compatibility/2006">
-        <mc:Choice xmlns:a14="http://schemas.microsoft.com/office/drawing/2010/main" Requires="a14">
+      <mc:AlternateContent xmlns:mc="http://schemas.openxmlformats.org/markup-compatibility/2006" xmlns:a14="http://schemas.microsoft.com/office/drawing/2010/main">
+        <mc:Choice Requires="a14">
           <p:sp>
             <p:nvSpPr>
               <p:cNvPr id="92" name="TextBox 91"/>
@@ -12325,7 +12313,7 @@
             </p:txBody>
           </p:sp>
         </mc:Choice>
-        <mc:Fallback>
+        <mc:Fallback xmlns="">
           <p:sp>
             <p:nvSpPr>
               <p:cNvPr id="92" name="TextBox 91"/>
@@ -12364,8 +12352,8 @@
           </p:sp>
         </mc:Fallback>
       </mc:AlternateContent>
-      <mc:AlternateContent xmlns:mc="http://schemas.openxmlformats.org/markup-compatibility/2006">
-        <mc:Choice xmlns:a14="http://schemas.microsoft.com/office/drawing/2010/main" Requires="a14">
+      <mc:AlternateContent xmlns:mc="http://schemas.openxmlformats.org/markup-compatibility/2006" xmlns:a14="http://schemas.microsoft.com/office/drawing/2010/main">
+        <mc:Choice Requires="a14">
           <p:sp>
             <p:nvSpPr>
               <p:cNvPr id="94" name="TextBox 93"/>
@@ -12428,7 +12416,7 @@
             </p:txBody>
           </p:sp>
         </mc:Choice>
-        <mc:Fallback>
+        <mc:Fallback xmlns="">
           <p:sp>
             <p:nvSpPr>
               <p:cNvPr id="94" name="TextBox 93"/>
@@ -12467,8 +12455,8 @@
           </p:sp>
         </mc:Fallback>
       </mc:AlternateContent>
-      <mc:AlternateContent xmlns:mc="http://schemas.openxmlformats.org/markup-compatibility/2006">
-        <mc:Choice xmlns:a14="http://schemas.microsoft.com/office/drawing/2010/main" Requires="a14">
+      <mc:AlternateContent xmlns:mc="http://schemas.openxmlformats.org/markup-compatibility/2006" xmlns:a14="http://schemas.microsoft.com/office/drawing/2010/main">
+        <mc:Choice Requires="a14">
           <p:sp>
             <p:nvSpPr>
               <p:cNvPr id="95" name="TextBox 94"/>
@@ -12531,7 +12519,7 @@
             </p:txBody>
           </p:sp>
         </mc:Choice>
-        <mc:Fallback>
+        <mc:Fallback xmlns="">
           <p:sp>
             <p:nvSpPr>
               <p:cNvPr id="95" name="TextBox 94"/>
@@ -13143,8 +13131,8 @@
           </a:p>
         </p:txBody>
       </p:sp>
-      <mc:AlternateContent xmlns:mc="http://schemas.openxmlformats.org/markup-compatibility/2006">
-        <mc:Choice xmlns:a14="http://schemas.microsoft.com/office/drawing/2010/main" Requires="a14">
+      <mc:AlternateContent xmlns:mc="http://schemas.openxmlformats.org/markup-compatibility/2006" xmlns:a14="http://schemas.microsoft.com/office/drawing/2010/main">
+        <mc:Choice Requires="a14">
           <p:sp>
             <p:nvSpPr>
               <p:cNvPr id="157" name="TextBox 156"/>
@@ -13207,7 +13195,7 @@
             </p:txBody>
           </p:sp>
         </mc:Choice>
-        <mc:Fallback>
+        <mc:Fallback xmlns="">
           <p:sp>
             <p:nvSpPr>
               <p:cNvPr id="157" name="TextBox 156"/>
@@ -13246,8 +13234,8 @@
           </p:sp>
         </mc:Fallback>
       </mc:AlternateContent>
-      <mc:AlternateContent xmlns:mc="http://schemas.openxmlformats.org/markup-compatibility/2006">
-        <mc:Choice xmlns:a14="http://schemas.microsoft.com/office/drawing/2010/main" Requires="a14">
+      <mc:AlternateContent xmlns:mc="http://schemas.openxmlformats.org/markup-compatibility/2006" xmlns:a14="http://schemas.microsoft.com/office/drawing/2010/main">
+        <mc:Choice Requires="a14">
           <p:sp>
             <p:nvSpPr>
               <p:cNvPr id="158" name="TextBox 157"/>
@@ -13310,7 +13298,7 @@
             </p:txBody>
           </p:sp>
         </mc:Choice>
-        <mc:Fallback>
+        <mc:Fallback xmlns="">
           <p:sp>
             <p:nvSpPr>
               <p:cNvPr id="158" name="TextBox 157"/>
@@ -13349,8 +13337,8 @@
           </p:sp>
         </mc:Fallback>
       </mc:AlternateContent>
-      <mc:AlternateContent xmlns:mc="http://schemas.openxmlformats.org/markup-compatibility/2006">
-        <mc:Choice xmlns:a14="http://schemas.microsoft.com/office/drawing/2010/main" Requires="a14">
+      <mc:AlternateContent xmlns:mc="http://schemas.openxmlformats.org/markup-compatibility/2006" xmlns:a14="http://schemas.microsoft.com/office/drawing/2010/main">
+        <mc:Choice Requires="a14">
           <p:sp>
             <p:nvSpPr>
               <p:cNvPr id="159" name="TextBox 158"/>
@@ -13413,7 +13401,7 @@
             </p:txBody>
           </p:sp>
         </mc:Choice>
-        <mc:Fallback>
+        <mc:Fallback xmlns="">
           <p:sp>
             <p:nvSpPr>
               <p:cNvPr id="159" name="TextBox 158"/>
@@ -13691,8 +13679,8 @@
           </a:p>
         </p:txBody>
       </p:sp>
-      <mc:AlternateContent xmlns:mc="http://schemas.openxmlformats.org/markup-compatibility/2006">
-        <mc:Choice xmlns:a14="http://schemas.microsoft.com/office/drawing/2010/main" Requires="a14">
+      <mc:AlternateContent xmlns:mc="http://schemas.openxmlformats.org/markup-compatibility/2006" xmlns:a14="http://schemas.microsoft.com/office/drawing/2010/main">
+        <mc:Choice Requires="a14">
           <p:sp>
             <p:nvSpPr>
               <p:cNvPr id="173" name="TextBox 172"/>
@@ -13755,7 +13743,7 @@
             </p:txBody>
           </p:sp>
         </mc:Choice>
-        <mc:Fallback>
+        <mc:Fallback xmlns="">
           <p:sp>
             <p:nvSpPr>
               <p:cNvPr id="173" name="TextBox 172"/>
@@ -15037,8 +15025,8 @@
           </a:p>
         </p:txBody>
       </p:sp>
-      <mc:AlternateContent xmlns:mc="http://schemas.openxmlformats.org/markup-compatibility/2006">
-        <mc:Choice xmlns:a14="http://schemas.microsoft.com/office/drawing/2010/main" Requires="a14">
+      <mc:AlternateContent xmlns:mc="http://schemas.openxmlformats.org/markup-compatibility/2006" xmlns:a14="http://schemas.microsoft.com/office/drawing/2010/main">
+        <mc:Choice Requires="a14">
           <p:sp>
             <p:nvSpPr>
               <p:cNvPr id="208" name="TextBox 207"/>
@@ -15101,7 +15089,7 @@
             </p:txBody>
           </p:sp>
         </mc:Choice>
-        <mc:Fallback>
+        <mc:Fallback xmlns="">
           <p:sp>
             <p:nvSpPr>
               <p:cNvPr id="208" name="TextBox 207"/>
@@ -15273,8 +15261,8 @@
           </a:fontRef>
         </p:style>
       </p:cxnSp>
-      <mc:AlternateContent xmlns:mc="http://schemas.openxmlformats.org/markup-compatibility/2006">
-        <mc:Choice xmlns:a14="http://schemas.microsoft.com/office/drawing/2010/main" Requires="a14">
+      <mc:AlternateContent xmlns:mc="http://schemas.openxmlformats.org/markup-compatibility/2006" xmlns:a14="http://schemas.microsoft.com/office/drawing/2010/main">
+        <mc:Choice Requires="a14">
           <p:sp>
             <p:nvSpPr>
               <p:cNvPr id="213" name="TextBox 212"/>
@@ -15368,7 +15356,7 @@
             </p:txBody>
           </p:sp>
         </mc:Choice>
-        <mc:Fallback>
+        <mc:Fallback xmlns="">
           <p:sp>
             <p:nvSpPr>
               <p:cNvPr id="213" name="TextBox 212"/>
@@ -15407,8 +15395,8 @@
           </p:sp>
         </mc:Fallback>
       </mc:AlternateContent>
-      <mc:AlternateContent xmlns:mc="http://schemas.openxmlformats.org/markup-compatibility/2006">
-        <mc:Choice xmlns:a14="http://schemas.microsoft.com/office/drawing/2010/main" Requires="a14">
+      <mc:AlternateContent xmlns:mc="http://schemas.openxmlformats.org/markup-compatibility/2006" xmlns:a14="http://schemas.microsoft.com/office/drawing/2010/main">
+        <mc:Choice Requires="a14">
           <p:sp>
             <p:nvSpPr>
               <p:cNvPr id="214" name="TextBox 213"/>
@@ -15471,7 +15459,7 @@
             </p:txBody>
           </p:sp>
         </mc:Choice>
-        <mc:Fallback>
+        <mc:Fallback xmlns="">
           <p:sp>
             <p:nvSpPr>
               <p:cNvPr id="214" name="TextBox 213"/>
@@ -15510,8 +15498,8 @@
           </p:sp>
         </mc:Fallback>
       </mc:AlternateContent>
-      <mc:AlternateContent xmlns:mc="http://schemas.openxmlformats.org/markup-compatibility/2006">
-        <mc:Choice xmlns:a14="http://schemas.microsoft.com/office/drawing/2010/main" Requires="a14">
+      <mc:AlternateContent xmlns:mc="http://schemas.openxmlformats.org/markup-compatibility/2006" xmlns:a14="http://schemas.microsoft.com/office/drawing/2010/main">
+        <mc:Choice Requires="a14">
           <p:sp>
             <p:nvSpPr>
               <p:cNvPr id="215" name="TextBox 214"/>
@@ -15574,7 +15562,7 @@
             </p:txBody>
           </p:sp>
         </mc:Choice>
-        <mc:Fallback>
+        <mc:Fallback xmlns="">
           <p:sp>
             <p:nvSpPr>
               <p:cNvPr id="215" name="TextBox 214"/>
@@ -15766,8 +15754,8 @@
           </a:p>
         </p:txBody>
       </p:sp>
-      <mc:AlternateContent xmlns:mc="http://schemas.openxmlformats.org/markup-compatibility/2006">
-        <mc:Choice xmlns:a14="http://schemas.microsoft.com/office/drawing/2010/main" Requires="a14">
+      <mc:AlternateContent xmlns:mc="http://schemas.openxmlformats.org/markup-compatibility/2006" xmlns:a14="http://schemas.microsoft.com/office/drawing/2010/main">
+        <mc:Choice Requires="a14">
           <p:sp>
             <p:nvSpPr>
               <p:cNvPr id="222" name="TextBox 221"/>
@@ -15830,7 +15818,7 @@
             </p:txBody>
           </p:sp>
         </mc:Choice>
-        <mc:Fallback>
+        <mc:Fallback xmlns="">
           <p:sp>
             <p:nvSpPr>
               <p:cNvPr id="222" name="TextBox 221"/>
@@ -17118,8 +17106,8 @@
           </a:p>
         </p:txBody>
       </p:sp>
-      <mc:AlternateContent xmlns:mc="http://schemas.openxmlformats.org/markup-compatibility/2006">
-        <mc:Choice xmlns:a14="http://schemas.microsoft.com/office/drawing/2010/main" Requires="a14">
+      <mc:AlternateContent xmlns:mc="http://schemas.openxmlformats.org/markup-compatibility/2006" xmlns:a14="http://schemas.microsoft.com/office/drawing/2010/main">
+        <mc:Choice Requires="a14">
           <p:sp>
             <p:nvSpPr>
               <p:cNvPr id="285" name="TextBox 284"/>
@@ -17213,7 +17201,7 @@
             </p:txBody>
           </p:sp>
         </mc:Choice>
-        <mc:Fallback>
+        <mc:Fallback xmlns="">
           <p:sp>
             <p:nvSpPr>
               <p:cNvPr id="285" name="TextBox 284"/>
@@ -17252,8 +17240,8 @@
           </p:sp>
         </mc:Fallback>
       </mc:AlternateContent>
-      <mc:AlternateContent xmlns:mc="http://schemas.openxmlformats.org/markup-compatibility/2006">
-        <mc:Choice xmlns:a14="http://schemas.microsoft.com/office/drawing/2010/main" Requires="a14">
+      <mc:AlternateContent xmlns:mc="http://schemas.openxmlformats.org/markup-compatibility/2006" xmlns:a14="http://schemas.microsoft.com/office/drawing/2010/main">
+        <mc:Choice Requires="a14">
           <p:sp>
             <p:nvSpPr>
               <p:cNvPr id="286" name="TextBox 285"/>
@@ -17316,7 +17304,7 @@
             </p:txBody>
           </p:sp>
         </mc:Choice>
-        <mc:Fallback>
+        <mc:Fallback xmlns="">
           <p:sp>
             <p:nvSpPr>
               <p:cNvPr id="286" name="TextBox 285"/>
@@ -17355,8 +17343,8 @@
           </p:sp>
         </mc:Fallback>
       </mc:AlternateContent>
-      <mc:AlternateContent xmlns:mc="http://schemas.openxmlformats.org/markup-compatibility/2006">
-        <mc:Choice xmlns:a14="http://schemas.microsoft.com/office/drawing/2010/main" Requires="a14">
+      <mc:AlternateContent xmlns:mc="http://schemas.openxmlformats.org/markup-compatibility/2006" xmlns:a14="http://schemas.microsoft.com/office/drawing/2010/main">
+        <mc:Choice Requires="a14">
           <p:sp>
             <p:nvSpPr>
               <p:cNvPr id="287" name="TextBox 286"/>
@@ -17419,7 +17407,7 @@
             </p:txBody>
           </p:sp>
         </mc:Choice>
-        <mc:Fallback>
+        <mc:Fallback xmlns="">
           <p:sp>
             <p:nvSpPr>
               <p:cNvPr id="287" name="TextBox 286"/>
@@ -18193,8 +18181,8 @@
           </a:p>
         </p:txBody>
       </p:sp>
-      <mc:AlternateContent xmlns:mc="http://schemas.openxmlformats.org/markup-compatibility/2006">
-        <mc:Choice xmlns:a14="http://schemas.microsoft.com/office/drawing/2010/main" Requires="a14">
+      <mc:AlternateContent xmlns:mc="http://schemas.openxmlformats.org/markup-compatibility/2006" xmlns:a14="http://schemas.microsoft.com/office/drawing/2010/main">
+        <mc:Choice Requires="a14">
           <p:sp>
             <p:nvSpPr>
               <p:cNvPr id="306" name="TextBox 305"/>
@@ -18257,7 +18245,7 @@
             </p:txBody>
           </p:sp>
         </mc:Choice>
-        <mc:Fallback>
+        <mc:Fallback xmlns="">
           <p:sp>
             <p:nvSpPr>
               <p:cNvPr id="306" name="TextBox 305"/>
@@ -28500,11 +28488,6 @@
               </a:rPr>
               <a:t>0</a:t>
             </a:r>
-            <a:endParaRPr lang="en-US" sz="1600" dirty="0">
-              <a:latin typeface="Apple Chancery" charset="0"/>
-              <a:ea typeface="Apple Chancery" charset="0"/>
-              <a:cs typeface="Apple Chancery" charset="0"/>
-            </a:endParaRPr>
           </a:p>
         </p:txBody>
       </p:sp>
@@ -28736,11 +28719,6 @@
               </a:rPr>
               <a:t>2</a:t>
             </a:r>
-            <a:endParaRPr lang="en-US" sz="1600" dirty="0">
-              <a:latin typeface="Apple Chancery" charset="0"/>
-              <a:ea typeface="Apple Chancery" charset="0"/>
-              <a:cs typeface="Apple Chancery" charset="0"/>
-            </a:endParaRPr>
           </a:p>
         </p:txBody>
       </p:sp>
@@ -28807,11 +28785,6 @@
               </a:rPr>
               <a:t>2</a:t>
             </a:r>
-            <a:endParaRPr lang="en-US" sz="1600" dirty="0">
-              <a:latin typeface="Apple Chancery" charset="0"/>
-              <a:ea typeface="Apple Chancery" charset="0"/>
-              <a:cs typeface="Apple Chancery" charset="0"/>
-            </a:endParaRPr>
           </a:p>
         </p:txBody>
       </p:sp>
@@ -28845,11 +28818,6 @@
               </a:rPr>
               <a:t>2</a:t>
             </a:r>
-            <a:endParaRPr lang="en-US" sz="1600" dirty="0">
-              <a:latin typeface="Apple Chancery" charset="0"/>
-              <a:ea typeface="Apple Chancery" charset="0"/>
-              <a:cs typeface="Apple Chancery" charset="0"/>
-            </a:endParaRPr>
           </a:p>
         </p:txBody>
       </p:sp>
@@ -40043,7 +40011,7 @@
         </p:nvGrpSpPr>
         <p:grpSpPr>
           <a:xfrm>
-            <a:off x="5288515" y="871019"/>
+            <a:off x="2875515" y="1036119"/>
             <a:ext cx="4002406" cy="3717748"/>
             <a:chOff x="4467540" y="885213"/>
             <a:chExt cx="4002406" cy="3717748"/>
@@ -41303,8 +41271,8 @@
               </a:p>
             </p:txBody>
           </p:sp>
-          <mc:AlternateContent xmlns:mc="http://schemas.openxmlformats.org/markup-compatibility/2006">
-            <mc:Choice xmlns:a14="http://schemas.microsoft.com/office/drawing/2010/main" Requires="a14">
+          <mc:AlternateContent xmlns:mc="http://schemas.openxmlformats.org/markup-compatibility/2006" xmlns:a14="http://schemas.microsoft.com/office/drawing/2010/main">
+            <mc:Choice Requires="a14">
               <p:sp>
                 <p:nvSpPr>
                   <p:cNvPr id="77" name="TextBox 76"/>
@@ -41371,7 +41339,7 @@
                 </p:txBody>
               </p:sp>
             </mc:Choice>
-            <mc:Fallback>
+            <mc:Fallback xmlns="">
               <p:sp>
                 <p:nvSpPr>
                   <p:cNvPr id="77" name="TextBox 76"/>
@@ -41419,7 +41387,7 @@
           </p:nvSpPr>
           <p:spPr>
             <a:xfrm>
-              <a:off x="4983414" y="2827520"/>
+              <a:off x="4983414" y="2814820"/>
               <a:ext cx="144394" cy="144394"/>
             </a:xfrm>
             <a:prstGeom prst="ellipse">
@@ -41513,7 +41481,7 @@
           </p:nvSpPr>
           <p:spPr>
             <a:xfrm>
-              <a:off x="6537324" y="2809521"/>
+              <a:off x="6537324" y="2822221"/>
               <a:ext cx="144394" cy="144394"/>
             </a:xfrm>
             <a:prstGeom prst="ellipse">
@@ -41691,6 +41659,2106 @@
           </p:txBody>
         </p:sp>
       </p:grpSp>
+      <p:grpSp>
+        <p:nvGrpSpPr>
+          <p:cNvPr id="47" name="Group 46"/>
+          <p:cNvGrpSpPr/>
+          <p:nvPr/>
+        </p:nvGrpSpPr>
+        <p:grpSpPr>
+          <a:xfrm>
+            <a:off x="7150223" y="749791"/>
+            <a:ext cx="4002406" cy="4004076"/>
+            <a:chOff x="4467540" y="598885"/>
+            <a:chExt cx="4002406" cy="4004076"/>
+          </a:xfrm>
+        </p:grpSpPr>
+        <p:grpSp>
+          <p:nvGrpSpPr>
+            <p:cNvPr id="48" name="Group 47"/>
+            <p:cNvGrpSpPr/>
+            <p:nvPr/>
+          </p:nvGrpSpPr>
+          <p:grpSpPr>
+            <a:xfrm>
+              <a:off x="4467540" y="598885"/>
+              <a:ext cx="4002406" cy="4004076"/>
+              <a:chOff x="5819262" y="2719233"/>
+              <a:chExt cx="4002406" cy="4004076"/>
+            </a:xfrm>
+          </p:grpSpPr>
+          <p:grpSp>
+            <p:nvGrpSpPr>
+              <p:cNvPr id="66" name="Group 65"/>
+              <p:cNvGrpSpPr/>
+              <p:nvPr/>
+            </p:nvGrpSpPr>
+            <p:grpSpPr>
+              <a:xfrm>
+                <a:off x="5980512" y="3005561"/>
+                <a:ext cx="3724778" cy="3293155"/>
+                <a:chOff x="5980512" y="3005561"/>
+                <a:chExt cx="3724778" cy="3293155"/>
+              </a:xfrm>
+            </p:grpSpPr>
+            <p:cxnSp>
+              <p:nvCxnSpPr>
+                <p:cNvPr id="103" name="Straight Connector 102"/>
+                <p:cNvCxnSpPr/>
+                <p:nvPr/>
+              </p:nvCxnSpPr>
+              <p:spPr>
+                <a:xfrm flipV="1">
+                  <a:off x="6991048" y="5015320"/>
+                  <a:ext cx="215346" cy="629476"/>
+                </a:xfrm>
+                <a:prstGeom prst="line">
+                  <a:avLst/>
+                </a:prstGeom>
+                <a:ln>
+                  <a:solidFill>
+                    <a:schemeClr val="tx1"/>
+                  </a:solidFill>
+                  <a:headEnd type="oval"/>
+                  <a:tailEnd type="none"/>
+                </a:ln>
+              </p:spPr>
+              <p:style>
+                <a:lnRef idx="1">
+                  <a:schemeClr val="accent1"/>
+                </a:lnRef>
+                <a:fillRef idx="0">
+                  <a:schemeClr val="accent1"/>
+                </a:fillRef>
+                <a:effectRef idx="0">
+                  <a:schemeClr val="accent1"/>
+                </a:effectRef>
+                <a:fontRef idx="minor">
+                  <a:schemeClr val="tx1"/>
+                </a:fontRef>
+              </p:style>
+            </p:cxnSp>
+            <p:cxnSp>
+              <p:nvCxnSpPr>
+                <p:cNvPr id="104" name="Straight Connector 103"/>
+                <p:cNvCxnSpPr/>
+                <p:nvPr/>
+              </p:nvCxnSpPr>
+              <p:spPr>
+                <a:xfrm>
+                  <a:off x="7206394" y="5015319"/>
+                  <a:ext cx="192157" cy="629477"/>
+                </a:xfrm>
+                <a:prstGeom prst="line">
+                  <a:avLst/>
+                </a:prstGeom>
+                <a:ln>
+                  <a:solidFill>
+                    <a:schemeClr val="tx1"/>
+                  </a:solidFill>
+                  <a:headEnd type="none"/>
+                  <a:tailEnd type="oval"/>
+                </a:ln>
+              </p:spPr>
+              <p:style>
+                <a:lnRef idx="1">
+                  <a:schemeClr val="accent1"/>
+                </a:lnRef>
+                <a:fillRef idx="0">
+                  <a:schemeClr val="accent1"/>
+                </a:fillRef>
+                <a:effectRef idx="0">
+                  <a:schemeClr val="accent1"/>
+                </a:effectRef>
+                <a:fontRef idx="minor">
+                  <a:schemeClr val="tx1"/>
+                </a:fontRef>
+              </p:style>
+            </p:cxnSp>
+            <p:cxnSp>
+              <p:nvCxnSpPr>
+                <p:cNvPr id="105" name="Straight Connector 104"/>
+                <p:cNvCxnSpPr/>
+                <p:nvPr/>
+              </p:nvCxnSpPr>
+              <p:spPr>
+                <a:xfrm flipV="1">
+                  <a:off x="7199578" y="4377141"/>
+                  <a:ext cx="384313" cy="629477"/>
+                </a:xfrm>
+                <a:prstGeom prst="line">
+                  <a:avLst/>
+                </a:prstGeom>
+                <a:ln>
+                  <a:solidFill>
+                    <a:schemeClr val="tx1"/>
+                  </a:solidFill>
+                  <a:headEnd type="oval"/>
+                  <a:tailEnd type="none"/>
+                </a:ln>
+              </p:spPr>
+              <p:style>
+                <a:lnRef idx="1">
+                  <a:schemeClr val="accent1"/>
+                </a:lnRef>
+                <a:fillRef idx="0">
+                  <a:schemeClr val="accent1"/>
+                </a:fillRef>
+                <a:effectRef idx="0">
+                  <a:schemeClr val="accent1"/>
+                </a:effectRef>
+                <a:fontRef idx="minor">
+                  <a:schemeClr val="tx1"/>
+                </a:fontRef>
+              </p:style>
+            </p:cxnSp>
+            <p:cxnSp>
+              <p:nvCxnSpPr>
+                <p:cNvPr id="106" name="Straight Connector 105"/>
+                <p:cNvCxnSpPr/>
+                <p:nvPr/>
+              </p:nvCxnSpPr>
+              <p:spPr>
+                <a:xfrm>
+                  <a:off x="7583890" y="4377141"/>
+                  <a:ext cx="384313" cy="629477"/>
+                </a:xfrm>
+                <a:prstGeom prst="line">
+                  <a:avLst/>
+                </a:prstGeom>
+                <a:ln>
+                  <a:solidFill>
+                    <a:schemeClr val="tx1"/>
+                  </a:solidFill>
+                  <a:headEnd type="none"/>
+                  <a:tailEnd type="oval"/>
+                </a:ln>
+              </p:spPr>
+              <p:style>
+                <a:lnRef idx="1">
+                  <a:schemeClr val="accent1"/>
+                </a:lnRef>
+                <a:fillRef idx="0">
+                  <a:schemeClr val="accent1"/>
+                </a:fillRef>
+                <a:effectRef idx="0">
+                  <a:schemeClr val="accent1"/>
+                </a:effectRef>
+                <a:fontRef idx="minor">
+                  <a:schemeClr val="tx1"/>
+                </a:fontRef>
+              </p:style>
+            </p:cxnSp>
+            <p:cxnSp>
+              <p:nvCxnSpPr>
+                <p:cNvPr id="107" name="Straight Connector 106"/>
+                <p:cNvCxnSpPr/>
+                <p:nvPr/>
+              </p:nvCxnSpPr>
+              <p:spPr>
+                <a:xfrm flipV="1">
+                  <a:off x="7749543" y="5015320"/>
+                  <a:ext cx="215346" cy="629476"/>
+                </a:xfrm>
+                <a:prstGeom prst="line">
+                  <a:avLst/>
+                </a:prstGeom>
+                <a:ln>
+                  <a:solidFill>
+                    <a:schemeClr val="tx1"/>
+                  </a:solidFill>
+                  <a:headEnd type="oval"/>
+                  <a:tailEnd type="none"/>
+                </a:ln>
+              </p:spPr>
+              <p:style>
+                <a:lnRef idx="1">
+                  <a:schemeClr val="accent1"/>
+                </a:lnRef>
+                <a:fillRef idx="0">
+                  <a:schemeClr val="accent1"/>
+                </a:fillRef>
+                <a:effectRef idx="0">
+                  <a:schemeClr val="accent1"/>
+                </a:effectRef>
+                <a:fontRef idx="minor">
+                  <a:schemeClr val="tx1"/>
+                </a:fontRef>
+              </p:style>
+            </p:cxnSp>
+            <p:cxnSp>
+              <p:nvCxnSpPr>
+                <p:cNvPr id="108" name="Straight Connector 107"/>
+                <p:cNvCxnSpPr/>
+                <p:nvPr/>
+              </p:nvCxnSpPr>
+              <p:spPr>
+                <a:xfrm>
+                  <a:off x="7964889" y="5015319"/>
+                  <a:ext cx="192157" cy="629477"/>
+                </a:xfrm>
+                <a:prstGeom prst="line">
+                  <a:avLst/>
+                </a:prstGeom>
+                <a:ln>
+                  <a:solidFill>
+                    <a:schemeClr val="tx1"/>
+                  </a:solidFill>
+                  <a:headEnd type="none"/>
+                  <a:tailEnd type="oval"/>
+                </a:ln>
+              </p:spPr>
+              <p:style>
+                <a:lnRef idx="1">
+                  <a:schemeClr val="accent1"/>
+                </a:lnRef>
+                <a:fillRef idx="0">
+                  <a:schemeClr val="accent1"/>
+                </a:fillRef>
+                <a:effectRef idx="0">
+                  <a:schemeClr val="accent1"/>
+                </a:effectRef>
+                <a:fontRef idx="minor">
+                  <a:schemeClr val="tx1"/>
+                </a:fontRef>
+              </p:style>
+            </p:cxnSp>
+            <p:cxnSp>
+              <p:nvCxnSpPr>
+                <p:cNvPr id="112" name="Straight Connector 111"/>
+                <p:cNvCxnSpPr/>
+                <p:nvPr/>
+              </p:nvCxnSpPr>
+              <p:spPr>
+                <a:xfrm flipV="1">
+                  <a:off x="6195858" y="5025045"/>
+                  <a:ext cx="215346" cy="629476"/>
+                </a:xfrm>
+                <a:prstGeom prst="line">
+                  <a:avLst/>
+                </a:prstGeom>
+                <a:ln>
+                  <a:solidFill>
+                    <a:schemeClr val="tx1"/>
+                  </a:solidFill>
+                  <a:headEnd type="oval"/>
+                  <a:tailEnd type="none"/>
+                </a:ln>
+              </p:spPr>
+              <p:style>
+                <a:lnRef idx="1">
+                  <a:schemeClr val="accent1"/>
+                </a:lnRef>
+                <a:fillRef idx="0">
+                  <a:schemeClr val="accent1"/>
+                </a:fillRef>
+                <a:effectRef idx="0">
+                  <a:schemeClr val="accent1"/>
+                </a:effectRef>
+                <a:fontRef idx="minor">
+                  <a:schemeClr val="tx1"/>
+                </a:fontRef>
+              </p:style>
+            </p:cxnSp>
+            <p:cxnSp>
+              <p:nvCxnSpPr>
+                <p:cNvPr id="113" name="Straight Connector 112"/>
+                <p:cNvCxnSpPr/>
+                <p:nvPr/>
+              </p:nvCxnSpPr>
+              <p:spPr>
+                <a:xfrm>
+                  <a:off x="6411204" y="5025044"/>
+                  <a:ext cx="192157" cy="629477"/>
+                </a:xfrm>
+                <a:prstGeom prst="line">
+                  <a:avLst/>
+                </a:prstGeom>
+                <a:ln>
+                  <a:solidFill>
+                    <a:schemeClr val="tx1"/>
+                  </a:solidFill>
+                  <a:headEnd type="none"/>
+                  <a:tailEnd type="oval"/>
+                </a:ln>
+              </p:spPr>
+              <p:style>
+                <a:lnRef idx="1">
+                  <a:schemeClr val="accent1"/>
+                </a:lnRef>
+                <a:fillRef idx="0">
+                  <a:schemeClr val="accent1"/>
+                </a:fillRef>
+                <a:effectRef idx="0">
+                  <a:schemeClr val="accent1"/>
+                </a:effectRef>
+                <a:fontRef idx="minor">
+                  <a:schemeClr val="tx1"/>
+                </a:fontRef>
+              </p:style>
+            </p:cxnSp>
+            <p:cxnSp>
+              <p:nvCxnSpPr>
+                <p:cNvPr id="114" name="Straight Connector 113"/>
+                <p:cNvCxnSpPr/>
+                <p:nvPr/>
+              </p:nvCxnSpPr>
+              <p:spPr>
+                <a:xfrm flipV="1">
+                  <a:off x="6412348" y="4377142"/>
+                  <a:ext cx="215346" cy="629476"/>
+                </a:xfrm>
+                <a:prstGeom prst="line">
+                  <a:avLst/>
+                </a:prstGeom>
+                <a:ln>
+                  <a:solidFill>
+                    <a:schemeClr val="tx1"/>
+                  </a:solidFill>
+                  <a:headEnd type="oval"/>
+                  <a:tailEnd type="none"/>
+                </a:ln>
+              </p:spPr>
+              <p:style>
+                <a:lnRef idx="1">
+                  <a:schemeClr val="accent1"/>
+                </a:lnRef>
+                <a:fillRef idx="0">
+                  <a:schemeClr val="accent1"/>
+                </a:fillRef>
+                <a:effectRef idx="0">
+                  <a:schemeClr val="accent1"/>
+                </a:effectRef>
+                <a:fontRef idx="minor">
+                  <a:schemeClr val="tx1"/>
+                </a:fontRef>
+              </p:style>
+            </p:cxnSp>
+            <p:cxnSp>
+              <p:nvCxnSpPr>
+                <p:cNvPr id="121" name="Straight Connector 120"/>
+                <p:cNvCxnSpPr/>
+                <p:nvPr/>
+              </p:nvCxnSpPr>
+              <p:spPr>
+                <a:xfrm>
+                  <a:off x="6627694" y="4377141"/>
+                  <a:ext cx="192157" cy="629477"/>
+                </a:xfrm>
+                <a:prstGeom prst="line">
+                  <a:avLst/>
+                </a:prstGeom>
+                <a:ln>
+                  <a:solidFill>
+                    <a:schemeClr val="tx1"/>
+                  </a:solidFill>
+                  <a:headEnd type="none"/>
+                  <a:tailEnd type="oval"/>
+                </a:ln>
+              </p:spPr>
+              <p:style>
+                <a:lnRef idx="1">
+                  <a:schemeClr val="accent1"/>
+                </a:lnRef>
+                <a:fillRef idx="0">
+                  <a:schemeClr val="accent1"/>
+                </a:fillRef>
+                <a:effectRef idx="0">
+                  <a:schemeClr val="accent1"/>
+                </a:effectRef>
+                <a:fontRef idx="minor">
+                  <a:schemeClr val="tx1"/>
+                </a:fontRef>
+              </p:style>
+            </p:cxnSp>
+            <p:cxnSp>
+              <p:nvCxnSpPr>
+                <p:cNvPr id="123" name="Straight Connector 122"/>
+                <p:cNvCxnSpPr/>
+                <p:nvPr/>
+              </p:nvCxnSpPr>
+              <p:spPr>
+                <a:xfrm flipV="1">
+                  <a:off x="5980512" y="5669240"/>
+                  <a:ext cx="215346" cy="629476"/>
+                </a:xfrm>
+                <a:prstGeom prst="line">
+                  <a:avLst/>
+                </a:prstGeom>
+                <a:ln>
+                  <a:solidFill>
+                    <a:schemeClr val="tx1"/>
+                  </a:solidFill>
+                  <a:headEnd type="oval"/>
+                  <a:tailEnd type="none"/>
+                </a:ln>
+              </p:spPr>
+              <p:style>
+                <a:lnRef idx="1">
+                  <a:schemeClr val="accent1"/>
+                </a:lnRef>
+                <a:fillRef idx="0">
+                  <a:schemeClr val="accent1"/>
+                </a:fillRef>
+                <a:effectRef idx="0">
+                  <a:schemeClr val="accent1"/>
+                </a:effectRef>
+                <a:fontRef idx="minor">
+                  <a:schemeClr val="tx1"/>
+                </a:fontRef>
+              </p:style>
+            </p:cxnSp>
+            <p:cxnSp>
+              <p:nvCxnSpPr>
+                <p:cNvPr id="124" name="Straight Connector 123"/>
+                <p:cNvCxnSpPr/>
+                <p:nvPr/>
+              </p:nvCxnSpPr>
+              <p:spPr>
+                <a:xfrm>
+                  <a:off x="6195858" y="5669239"/>
+                  <a:ext cx="192157" cy="629477"/>
+                </a:xfrm>
+                <a:prstGeom prst="line">
+                  <a:avLst/>
+                </a:prstGeom>
+                <a:ln>
+                  <a:solidFill>
+                    <a:schemeClr val="tx1"/>
+                  </a:solidFill>
+                  <a:headEnd type="none"/>
+                  <a:tailEnd type="oval"/>
+                </a:ln>
+              </p:spPr>
+              <p:style>
+                <a:lnRef idx="1">
+                  <a:schemeClr val="accent1"/>
+                </a:lnRef>
+                <a:fillRef idx="0">
+                  <a:schemeClr val="accent1"/>
+                </a:fillRef>
+                <a:effectRef idx="0">
+                  <a:schemeClr val="accent1"/>
+                </a:effectRef>
+                <a:fontRef idx="minor">
+                  <a:schemeClr val="tx1"/>
+                </a:fontRef>
+              </p:style>
+            </p:cxnSp>
+            <p:grpSp>
+              <p:nvGrpSpPr>
+                <p:cNvPr id="125" name="Group 124"/>
+                <p:cNvGrpSpPr/>
+                <p:nvPr/>
+              </p:nvGrpSpPr>
+              <p:grpSpPr>
+                <a:xfrm>
+                  <a:off x="6625399" y="3005561"/>
+                  <a:ext cx="2695578" cy="1353154"/>
+                  <a:chOff x="6625402" y="3005561"/>
+                  <a:chExt cx="2161623" cy="1353154"/>
+                </a:xfrm>
+              </p:grpSpPr>
+              <p:cxnSp>
+                <p:nvCxnSpPr>
+                  <p:cNvPr id="131" name="Straight Connector 130"/>
+                  <p:cNvCxnSpPr/>
+                  <p:nvPr/>
+                </p:nvCxnSpPr>
+                <p:spPr>
+                  <a:xfrm flipV="1">
+                    <a:off x="6625402" y="3729238"/>
+                    <a:ext cx="384313" cy="629477"/>
+                  </a:xfrm>
+                  <a:prstGeom prst="line">
+                    <a:avLst/>
+                  </a:prstGeom>
+                  <a:ln>
+                    <a:solidFill>
+                      <a:schemeClr val="tx1"/>
+                    </a:solidFill>
+                    <a:headEnd type="oval"/>
+                    <a:tailEnd type="none"/>
+                  </a:ln>
+                </p:spPr>
+                <p:style>
+                  <a:lnRef idx="1">
+                    <a:schemeClr val="accent1"/>
+                  </a:lnRef>
+                  <a:fillRef idx="0">
+                    <a:schemeClr val="accent1"/>
+                  </a:fillRef>
+                  <a:effectRef idx="0">
+                    <a:schemeClr val="accent1"/>
+                  </a:effectRef>
+                  <a:fontRef idx="minor">
+                    <a:schemeClr val="tx1"/>
+                  </a:fontRef>
+                </p:style>
+              </p:cxnSp>
+              <p:cxnSp>
+                <p:nvCxnSpPr>
+                  <p:cNvPr id="132" name="Straight Connector 131"/>
+                  <p:cNvCxnSpPr/>
+                  <p:nvPr/>
+                </p:nvCxnSpPr>
+                <p:spPr>
+                  <a:xfrm>
+                    <a:off x="7009714" y="3729238"/>
+                    <a:ext cx="384313" cy="629477"/>
+                  </a:xfrm>
+                  <a:prstGeom prst="line">
+                    <a:avLst/>
+                  </a:prstGeom>
+                  <a:ln>
+                    <a:solidFill>
+                      <a:schemeClr val="tx1"/>
+                    </a:solidFill>
+                    <a:headEnd type="none"/>
+                    <a:tailEnd type="oval"/>
+                  </a:ln>
+                </p:spPr>
+                <p:style>
+                  <a:lnRef idx="1">
+                    <a:schemeClr val="accent1"/>
+                  </a:lnRef>
+                  <a:fillRef idx="0">
+                    <a:schemeClr val="accent1"/>
+                  </a:fillRef>
+                  <a:effectRef idx="0">
+                    <a:schemeClr val="accent1"/>
+                  </a:effectRef>
+                  <a:fontRef idx="minor">
+                    <a:schemeClr val="tx1"/>
+                  </a:fontRef>
+                </p:style>
+              </p:cxnSp>
+              <p:cxnSp>
+                <p:nvCxnSpPr>
+                  <p:cNvPr id="133" name="Straight Connector 132"/>
+                  <p:cNvCxnSpPr/>
+                  <p:nvPr/>
+                </p:nvCxnSpPr>
+                <p:spPr>
+                  <a:xfrm flipV="1">
+                    <a:off x="7012731" y="3005561"/>
+                    <a:ext cx="683902" cy="723364"/>
+                  </a:xfrm>
+                  <a:prstGeom prst="line">
+                    <a:avLst/>
+                  </a:prstGeom>
+                  <a:ln>
+                    <a:solidFill>
+                      <a:schemeClr val="tx1"/>
+                    </a:solidFill>
+                    <a:headEnd type="oval"/>
+                    <a:tailEnd type="oval"/>
+                  </a:ln>
+                </p:spPr>
+                <p:style>
+                  <a:lnRef idx="1">
+                    <a:schemeClr val="accent1"/>
+                  </a:lnRef>
+                  <a:fillRef idx="0">
+                    <a:schemeClr val="accent1"/>
+                  </a:fillRef>
+                  <a:effectRef idx="0">
+                    <a:schemeClr val="accent1"/>
+                  </a:effectRef>
+                  <a:fontRef idx="minor">
+                    <a:schemeClr val="tx1"/>
+                  </a:fontRef>
+                </p:style>
+              </p:cxnSp>
+              <p:cxnSp>
+                <p:nvCxnSpPr>
+                  <p:cNvPr id="134" name="Straight Connector 133"/>
+                  <p:cNvCxnSpPr/>
+                  <p:nvPr/>
+                </p:nvCxnSpPr>
+                <p:spPr>
+                  <a:xfrm flipH="1" flipV="1">
+                    <a:off x="7702217" y="3005562"/>
+                    <a:ext cx="700496" cy="714975"/>
+                  </a:xfrm>
+                  <a:prstGeom prst="line">
+                    <a:avLst/>
+                  </a:prstGeom>
+                  <a:ln>
+                    <a:solidFill>
+                      <a:schemeClr val="tx1"/>
+                    </a:solidFill>
+                    <a:headEnd type="oval"/>
+                    <a:tailEnd type="none"/>
+                  </a:ln>
+                </p:spPr>
+                <p:style>
+                  <a:lnRef idx="1">
+                    <a:schemeClr val="accent1"/>
+                  </a:lnRef>
+                  <a:fillRef idx="0">
+                    <a:schemeClr val="accent1"/>
+                  </a:fillRef>
+                  <a:effectRef idx="0">
+                    <a:schemeClr val="accent1"/>
+                  </a:effectRef>
+                  <a:fontRef idx="minor">
+                    <a:schemeClr val="tx1"/>
+                  </a:fontRef>
+                </p:style>
+              </p:cxnSp>
+              <p:cxnSp>
+                <p:nvCxnSpPr>
+                  <p:cNvPr id="135" name="Straight Connector 134"/>
+                  <p:cNvCxnSpPr/>
+                  <p:nvPr/>
+                </p:nvCxnSpPr>
+                <p:spPr>
+                  <a:xfrm flipV="1">
+                    <a:off x="8018400" y="3716872"/>
+                    <a:ext cx="384313" cy="629477"/>
+                  </a:xfrm>
+                  <a:prstGeom prst="line">
+                    <a:avLst/>
+                  </a:prstGeom>
+                  <a:ln>
+                    <a:solidFill>
+                      <a:schemeClr val="tx1"/>
+                    </a:solidFill>
+                    <a:headEnd type="oval"/>
+                    <a:tailEnd type="none"/>
+                  </a:ln>
+                </p:spPr>
+                <p:style>
+                  <a:lnRef idx="1">
+                    <a:schemeClr val="accent1"/>
+                  </a:lnRef>
+                  <a:fillRef idx="0">
+                    <a:schemeClr val="accent1"/>
+                  </a:fillRef>
+                  <a:effectRef idx="0">
+                    <a:schemeClr val="accent1"/>
+                  </a:effectRef>
+                  <a:fontRef idx="minor">
+                    <a:schemeClr val="tx1"/>
+                  </a:fontRef>
+                </p:style>
+              </p:cxnSp>
+              <p:cxnSp>
+                <p:nvCxnSpPr>
+                  <p:cNvPr id="136" name="Straight Connector 135"/>
+                  <p:cNvCxnSpPr/>
+                  <p:nvPr/>
+                </p:nvCxnSpPr>
+                <p:spPr>
+                  <a:xfrm>
+                    <a:off x="8402712" y="3716872"/>
+                    <a:ext cx="384313" cy="629477"/>
+                  </a:xfrm>
+                  <a:prstGeom prst="line">
+                    <a:avLst/>
+                  </a:prstGeom>
+                  <a:ln>
+                    <a:solidFill>
+                      <a:schemeClr val="tx1"/>
+                    </a:solidFill>
+                    <a:headEnd type="none"/>
+                    <a:tailEnd type="oval"/>
+                  </a:ln>
+                </p:spPr>
+                <p:style>
+                  <a:lnRef idx="1">
+                    <a:schemeClr val="accent1"/>
+                  </a:lnRef>
+                  <a:fillRef idx="0">
+                    <a:schemeClr val="accent1"/>
+                  </a:fillRef>
+                  <a:effectRef idx="0">
+                    <a:schemeClr val="accent1"/>
+                  </a:effectRef>
+                  <a:fontRef idx="minor">
+                    <a:schemeClr val="tx1"/>
+                  </a:fontRef>
+                </p:style>
+              </p:cxnSp>
+            </p:grpSp>
+            <p:cxnSp>
+              <p:nvCxnSpPr>
+                <p:cNvPr id="127" name="Straight Connector 126"/>
+                <p:cNvCxnSpPr/>
+                <p:nvPr/>
+              </p:nvCxnSpPr>
+              <p:spPr>
+                <a:xfrm flipV="1">
+                  <a:off x="8936665" y="4376041"/>
+                  <a:ext cx="384313" cy="629477"/>
+                </a:xfrm>
+                <a:prstGeom prst="line">
+                  <a:avLst/>
+                </a:prstGeom>
+                <a:ln>
+                  <a:solidFill>
+                    <a:schemeClr val="tx1"/>
+                  </a:solidFill>
+                  <a:headEnd type="oval"/>
+                  <a:tailEnd type="none"/>
+                </a:ln>
+              </p:spPr>
+              <p:style>
+                <a:lnRef idx="1">
+                  <a:schemeClr val="accent1"/>
+                </a:lnRef>
+                <a:fillRef idx="0">
+                  <a:schemeClr val="accent1"/>
+                </a:fillRef>
+                <a:effectRef idx="0">
+                  <a:schemeClr val="accent1"/>
+                </a:effectRef>
+                <a:fontRef idx="minor">
+                  <a:schemeClr val="tx1"/>
+                </a:fontRef>
+              </p:style>
+            </p:cxnSp>
+            <p:cxnSp>
+              <p:nvCxnSpPr>
+                <p:cNvPr id="128" name="Straight Connector 127"/>
+                <p:cNvCxnSpPr/>
+                <p:nvPr/>
+              </p:nvCxnSpPr>
+              <p:spPr>
+                <a:xfrm>
+                  <a:off x="9320977" y="4376041"/>
+                  <a:ext cx="384313" cy="629477"/>
+                </a:xfrm>
+                <a:prstGeom prst="line">
+                  <a:avLst/>
+                </a:prstGeom>
+                <a:ln>
+                  <a:solidFill>
+                    <a:schemeClr val="tx1"/>
+                  </a:solidFill>
+                  <a:headEnd type="none"/>
+                  <a:tailEnd type="oval"/>
+                </a:ln>
+              </p:spPr>
+              <p:style>
+                <a:lnRef idx="1">
+                  <a:schemeClr val="accent1"/>
+                </a:lnRef>
+                <a:fillRef idx="0">
+                  <a:schemeClr val="accent1"/>
+                </a:fillRef>
+                <a:effectRef idx="0">
+                  <a:schemeClr val="accent1"/>
+                </a:effectRef>
+                <a:fontRef idx="minor">
+                  <a:schemeClr val="tx1"/>
+                </a:fontRef>
+              </p:style>
+            </p:cxnSp>
+            <p:cxnSp>
+              <p:nvCxnSpPr>
+                <p:cNvPr id="129" name="Straight Connector 128"/>
+                <p:cNvCxnSpPr/>
+                <p:nvPr/>
+              </p:nvCxnSpPr>
+              <p:spPr>
+                <a:xfrm flipV="1">
+                  <a:off x="8718005" y="5005519"/>
+                  <a:ext cx="215346" cy="629476"/>
+                </a:xfrm>
+                <a:prstGeom prst="line">
+                  <a:avLst/>
+                </a:prstGeom>
+                <a:ln>
+                  <a:solidFill>
+                    <a:schemeClr val="tx1"/>
+                  </a:solidFill>
+                  <a:headEnd type="oval"/>
+                  <a:tailEnd type="none"/>
+                </a:ln>
+              </p:spPr>
+              <p:style>
+                <a:lnRef idx="1">
+                  <a:schemeClr val="accent1"/>
+                </a:lnRef>
+                <a:fillRef idx="0">
+                  <a:schemeClr val="accent1"/>
+                </a:fillRef>
+                <a:effectRef idx="0">
+                  <a:schemeClr val="accent1"/>
+                </a:effectRef>
+                <a:fontRef idx="minor">
+                  <a:schemeClr val="tx1"/>
+                </a:fontRef>
+              </p:style>
+            </p:cxnSp>
+            <p:cxnSp>
+              <p:nvCxnSpPr>
+                <p:cNvPr id="130" name="Straight Connector 129"/>
+                <p:cNvCxnSpPr/>
+                <p:nvPr/>
+              </p:nvCxnSpPr>
+              <p:spPr>
+                <a:xfrm>
+                  <a:off x="8933351" y="5005518"/>
+                  <a:ext cx="192157" cy="629477"/>
+                </a:xfrm>
+                <a:prstGeom prst="line">
+                  <a:avLst/>
+                </a:prstGeom>
+                <a:ln>
+                  <a:solidFill>
+                    <a:schemeClr val="tx1"/>
+                  </a:solidFill>
+                  <a:headEnd type="none"/>
+                  <a:tailEnd type="oval"/>
+                </a:ln>
+              </p:spPr>
+              <p:style>
+                <a:lnRef idx="1">
+                  <a:schemeClr val="accent1"/>
+                </a:lnRef>
+                <a:fillRef idx="0">
+                  <a:schemeClr val="accent1"/>
+                </a:fillRef>
+                <a:effectRef idx="0">
+                  <a:schemeClr val="accent1"/>
+                </a:effectRef>
+                <a:fontRef idx="minor">
+                  <a:schemeClr val="tx1"/>
+                </a:fontRef>
+              </p:style>
+            </p:cxnSp>
+          </p:grpSp>
+          <p:sp>
+            <p:nvSpPr>
+              <p:cNvPr id="80" name="TextBox 79"/>
+              <p:cNvSpPr txBox="1"/>
+              <p:nvPr/>
+            </p:nvSpPr>
+            <p:spPr>
+              <a:xfrm>
+                <a:off x="5819262" y="6313435"/>
+                <a:ext cx="290464" cy="338554"/>
+              </a:xfrm>
+              <a:prstGeom prst="rect">
+                <a:avLst/>
+              </a:prstGeom>
+              <a:noFill/>
+            </p:spPr>
+            <p:txBody>
+              <a:bodyPr wrap="none" rtlCol="0">
+                <a:spAutoFit/>
+              </a:bodyPr>
+              <a:lstStyle/>
+              <a:p>
+                <a:r>
+                  <a:rPr lang="en-US" sz="1600" dirty="0">
+                    <a:latin typeface="Apple Chancery" charset="0"/>
+                    <a:ea typeface="Apple Chancery" charset="0"/>
+                    <a:cs typeface="Apple Chancery" charset="0"/>
+                  </a:rPr>
+                  <a:t>a</a:t>
+                </a:r>
+              </a:p>
+            </p:txBody>
+          </p:sp>
+          <p:sp>
+            <p:nvSpPr>
+              <p:cNvPr id="81" name="TextBox 80"/>
+              <p:cNvSpPr txBox="1"/>
+              <p:nvPr/>
+            </p:nvSpPr>
+            <p:spPr>
+              <a:xfrm>
+                <a:off x="6245989" y="6384755"/>
+                <a:ext cx="284052" cy="338554"/>
+              </a:xfrm>
+              <a:prstGeom prst="rect">
+                <a:avLst/>
+              </a:prstGeom>
+              <a:noFill/>
+            </p:spPr>
+            <p:txBody>
+              <a:bodyPr wrap="none" rtlCol="0">
+                <a:spAutoFit/>
+              </a:bodyPr>
+              <a:lstStyle/>
+              <a:p>
+                <a:r>
+                  <a:rPr lang="en-US" sz="1600" dirty="0">
+                    <a:latin typeface="Apple Chancery" charset="0"/>
+                    <a:ea typeface="Apple Chancery" charset="0"/>
+                    <a:cs typeface="Apple Chancery" charset="0"/>
+                  </a:rPr>
+                  <a:t>b</a:t>
+                </a:r>
+              </a:p>
+            </p:txBody>
+          </p:sp>
+          <p:sp>
+            <p:nvSpPr>
+              <p:cNvPr id="82" name="TextBox 81"/>
+              <p:cNvSpPr txBox="1"/>
+              <p:nvPr/>
+            </p:nvSpPr>
+            <p:spPr>
+              <a:xfrm>
+                <a:off x="6479725" y="5663222"/>
+                <a:ext cx="263214" cy="338554"/>
+              </a:xfrm>
+              <a:prstGeom prst="rect">
+                <a:avLst/>
+              </a:prstGeom>
+              <a:noFill/>
+            </p:spPr>
+            <p:txBody>
+              <a:bodyPr wrap="none" rtlCol="0">
+                <a:spAutoFit/>
+              </a:bodyPr>
+              <a:lstStyle/>
+              <a:p>
+                <a:r>
+                  <a:rPr lang="en-US" sz="1600" dirty="0">
+                    <a:latin typeface="Apple Chancery" charset="0"/>
+                    <a:ea typeface="Apple Chancery" charset="0"/>
+                    <a:cs typeface="Apple Chancery" charset="0"/>
+                  </a:rPr>
+                  <a:t>c</a:t>
+                </a:r>
+              </a:p>
+            </p:txBody>
+          </p:sp>
+          <p:sp>
+            <p:nvSpPr>
+              <p:cNvPr id="83" name="TextBox 82"/>
+              <p:cNvSpPr txBox="1"/>
+              <p:nvPr/>
+            </p:nvSpPr>
+            <p:spPr>
+              <a:xfrm>
+                <a:off x="6625402" y="5046656"/>
+                <a:ext cx="290464" cy="338554"/>
+              </a:xfrm>
+              <a:prstGeom prst="rect">
+                <a:avLst/>
+              </a:prstGeom>
+              <a:noFill/>
+            </p:spPr>
+            <p:txBody>
+              <a:bodyPr wrap="none" rtlCol="0">
+                <a:spAutoFit/>
+              </a:bodyPr>
+              <a:lstStyle/>
+              <a:p>
+                <a:r>
+                  <a:rPr lang="en-US" sz="1600" dirty="0">
+                    <a:latin typeface="Apple Chancery" charset="0"/>
+                    <a:ea typeface="Apple Chancery" charset="0"/>
+                    <a:cs typeface="Apple Chancery" charset="0"/>
+                  </a:rPr>
+                  <a:t>d</a:t>
+                </a:r>
+              </a:p>
+            </p:txBody>
+          </p:sp>
+          <p:sp>
+            <p:nvSpPr>
+              <p:cNvPr id="84" name="TextBox 83"/>
+              <p:cNvSpPr txBox="1"/>
+              <p:nvPr/>
+            </p:nvSpPr>
+            <p:spPr>
+              <a:xfrm>
+                <a:off x="6846796" y="5645423"/>
+                <a:ext cx="261610" cy="338554"/>
+              </a:xfrm>
+              <a:prstGeom prst="rect">
+                <a:avLst/>
+              </a:prstGeom>
+              <a:noFill/>
+            </p:spPr>
+            <p:txBody>
+              <a:bodyPr wrap="none" rtlCol="0">
+                <a:spAutoFit/>
+              </a:bodyPr>
+              <a:lstStyle/>
+              <a:p>
+                <a:r>
+                  <a:rPr lang="en-US" sz="1600" dirty="0">
+                    <a:latin typeface="Apple Chancery" charset="0"/>
+                    <a:ea typeface="Apple Chancery" charset="0"/>
+                    <a:cs typeface="Apple Chancery" charset="0"/>
+                  </a:rPr>
+                  <a:t>e</a:t>
+                </a:r>
+              </a:p>
+            </p:txBody>
+          </p:sp>
+          <p:sp>
+            <p:nvSpPr>
+              <p:cNvPr id="85" name="TextBox 84"/>
+              <p:cNvSpPr txBox="1"/>
+              <p:nvPr/>
+            </p:nvSpPr>
+            <p:spPr>
+              <a:xfrm>
+                <a:off x="7240700" y="5730295"/>
+                <a:ext cx="248786" cy="338554"/>
+              </a:xfrm>
+              <a:prstGeom prst="rect">
+                <a:avLst/>
+              </a:prstGeom>
+              <a:noFill/>
+            </p:spPr>
+            <p:txBody>
+              <a:bodyPr wrap="none" rtlCol="0">
+                <a:spAutoFit/>
+              </a:bodyPr>
+              <a:lstStyle/>
+              <a:p>
+                <a:r>
+                  <a:rPr lang="en-US" sz="1600" dirty="0">
+                    <a:latin typeface="Apple Chancery" charset="0"/>
+                    <a:ea typeface="Apple Chancery" charset="0"/>
+                    <a:cs typeface="Apple Chancery" charset="0"/>
+                  </a:rPr>
+                  <a:t>f</a:t>
+                </a:r>
+              </a:p>
+            </p:txBody>
+          </p:sp>
+          <p:sp>
+            <p:nvSpPr>
+              <p:cNvPr id="96" name="TextBox 95"/>
+              <p:cNvSpPr txBox="1"/>
+              <p:nvPr/>
+            </p:nvSpPr>
+            <p:spPr>
+              <a:xfrm>
+                <a:off x="7606167" y="5663222"/>
+                <a:ext cx="280846" cy="338554"/>
+              </a:xfrm>
+              <a:prstGeom prst="rect">
+                <a:avLst/>
+              </a:prstGeom>
+              <a:noFill/>
+            </p:spPr>
+            <p:txBody>
+              <a:bodyPr wrap="none" rtlCol="0">
+                <a:spAutoFit/>
+              </a:bodyPr>
+              <a:lstStyle/>
+              <a:p>
+                <a:r>
+                  <a:rPr lang="en-US" sz="1600" dirty="0">
+                    <a:latin typeface="Apple Chancery" charset="0"/>
+                    <a:ea typeface="Apple Chancery" charset="0"/>
+                    <a:cs typeface="Apple Chancery" charset="0"/>
+                  </a:rPr>
+                  <a:t>g</a:t>
+                </a:r>
+              </a:p>
+            </p:txBody>
+          </p:sp>
+          <p:sp>
+            <p:nvSpPr>
+              <p:cNvPr id="97" name="TextBox 96"/>
+              <p:cNvSpPr txBox="1"/>
+              <p:nvPr/>
+            </p:nvSpPr>
+            <p:spPr>
+              <a:xfrm>
+                <a:off x="8003694" y="5740014"/>
+                <a:ext cx="293670" cy="338554"/>
+              </a:xfrm>
+              <a:prstGeom prst="rect">
+                <a:avLst/>
+              </a:prstGeom>
+              <a:noFill/>
+            </p:spPr>
+            <p:txBody>
+              <a:bodyPr wrap="none" rtlCol="0">
+                <a:spAutoFit/>
+              </a:bodyPr>
+              <a:lstStyle/>
+              <a:p>
+                <a:r>
+                  <a:rPr lang="en-US" sz="1600" dirty="0">
+                    <a:latin typeface="Apple Chancery" charset="0"/>
+                    <a:ea typeface="Apple Chancery" charset="0"/>
+                    <a:cs typeface="Apple Chancery" charset="0"/>
+                  </a:rPr>
+                  <a:t>h</a:t>
+                </a:r>
+              </a:p>
+            </p:txBody>
+          </p:sp>
+          <p:sp>
+            <p:nvSpPr>
+              <p:cNvPr id="98" name="TextBox 97"/>
+              <p:cNvSpPr txBox="1"/>
+              <p:nvPr/>
+            </p:nvSpPr>
+            <p:spPr>
+              <a:xfrm>
+                <a:off x="8211192" y="4376041"/>
+                <a:ext cx="245580" cy="338554"/>
+              </a:xfrm>
+              <a:prstGeom prst="rect">
+                <a:avLst/>
+              </a:prstGeom>
+              <a:noFill/>
+            </p:spPr>
+            <p:txBody>
+              <a:bodyPr wrap="none" rtlCol="0">
+                <a:spAutoFit/>
+              </a:bodyPr>
+              <a:lstStyle/>
+              <a:p>
+                <a:r>
+                  <a:rPr lang="en-US" sz="1600" dirty="0">
+                    <a:latin typeface="Apple Chancery" charset="0"/>
+                    <a:ea typeface="Apple Chancery" charset="0"/>
+                    <a:cs typeface="Apple Chancery" charset="0"/>
+                  </a:rPr>
+                  <a:t>i</a:t>
+                </a:r>
+              </a:p>
+            </p:txBody>
+          </p:sp>
+          <p:sp>
+            <p:nvSpPr>
+              <p:cNvPr id="99" name="TextBox 98"/>
+              <p:cNvSpPr txBox="1"/>
+              <p:nvPr/>
+            </p:nvSpPr>
+            <p:spPr>
+              <a:xfrm>
+                <a:off x="9582500" y="5082587"/>
+                <a:ext cx="239168" cy="338554"/>
+              </a:xfrm>
+              <a:prstGeom prst="rect">
+                <a:avLst/>
+              </a:prstGeom>
+              <a:noFill/>
+            </p:spPr>
+            <p:txBody>
+              <a:bodyPr wrap="none" rtlCol="0">
+                <a:spAutoFit/>
+              </a:bodyPr>
+              <a:lstStyle/>
+              <a:p>
+                <a:r>
+                  <a:rPr lang="en-US" sz="1600" dirty="0">
+                    <a:latin typeface="Apple Chancery" charset="0"/>
+                    <a:ea typeface="Apple Chancery" charset="0"/>
+                    <a:cs typeface="Apple Chancery" charset="0"/>
+                  </a:rPr>
+                  <a:t>l</a:t>
+                </a:r>
+              </a:p>
+            </p:txBody>
+          </p:sp>
+          <p:sp>
+            <p:nvSpPr>
+              <p:cNvPr id="100" name="TextBox 99"/>
+              <p:cNvSpPr txBox="1"/>
+              <p:nvPr/>
+            </p:nvSpPr>
+            <p:spPr>
+              <a:xfrm>
+                <a:off x="8999510" y="5716993"/>
+                <a:ext cx="279244" cy="338554"/>
+              </a:xfrm>
+              <a:prstGeom prst="rect">
+                <a:avLst/>
+              </a:prstGeom>
+              <a:noFill/>
+            </p:spPr>
+            <p:txBody>
+              <a:bodyPr wrap="none" rtlCol="0">
+                <a:spAutoFit/>
+              </a:bodyPr>
+              <a:lstStyle/>
+              <a:p>
+                <a:r>
+                  <a:rPr lang="en-US" sz="1600" dirty="0">
+                    <a:latin typeface="Apple Chancery" charset="0"/>
+                    <a:ea typeface="Apple Chancery" charset="0"/>
+                    <a:cs typeface="Apple Chancery" charset="0"/>
+                  </a:rPr>
+                  <a:t>k</a:t>
+                </a:r>
+              </a:p>
+            </p:txBody>
+          </p:sp>
+          <p:sp>
+            <p:nvSpPr>
+              <p:cNvPr id="101" name="TextBox 100"/>
+              <p:cNvSpPr txBox="1"/>
+              <p:nvPr/>
+            </p:nvSpPr>
+            <p:spPr>
+              <a:xfrm>
+                <a:off x="8589159" y="5663222"/>
+                <a:ext cx="239168" cy="338554"/>
+              </a:xfrm>
+              <a:prstGeom prst="rect">
+                <a:avLst/>
+              </a:prstGeom>
+              <a:noFill/>
+            </p:spPr>
+            <p:txBody>
+              <a:bodyPr wrap="none" rtlCol="0">
+                <a:spAutoFit/>
+              </a:bodyPr>
+              <a:lstStyle/>
+              <a:p>
+                <a:r>
+                  <a:rPr lang="en-US" sz="1600" dirty="0">
+                    <a:latin typeface="Apple Chancery" charset="0"/>
+                    <a:ea typeface="Apple Chancery" charset="0"/>
+                    <a:cs typeface="Apple Chancery" charset="0"/>
+                  </a:rPr>
+                  <a:t>j</a:t>
+                </a:r>
+              </a:p>
+            </p:txBody>
+          </p:sp>
+          <mc:AlternateContent xmlns:mc="http://schemas.openxmlformats.org/markup-compatibility/2006">
+            <mc:Choice xmlns:a14="http://schemas.microsoft.com/office/drawing/2010/main" Requires="a14">
+              <p:sp>
+                <p:nvSpPr>
+                  <p:cNvPr id="102" name="TextBox 101"/>
+                  <p:cNvSpPr txBox="1"/>
+                  <p:nvPr/>
+                </p:nvSpPr>
+                <p:spPr>
+                  <a:xfrm>
+                    <a:off x="6720802" y="3455833"/>
+                    <a:ext cx="400110" cy="338554"/>
+                  </a:xfrm>
+                  <a:prstGeom prst="rect">
+                    <a:avLst/>
+                  </a:prstGeom>
+                  <a:noFill/>
+                </p:spPr>
+                <p:txBody>
+                  <a:bodyPr wrap="none" rtlCol="0">
+                    <a:spAutoFit/>
+                  </a:bodyPr>
+                  <a:lstStyle/>
+                  <a:p>
+                    <a:pPr/>
+                    <a14:m>
+                      <m:oMathPara xmlns:m="http://schemas.openxmlformats.org/officeDocument/2006/math">
+                        <m:oMathParaPr>
+                          <m:jc m:val="centerGroup"/>
+                        </m:oMathParaPr>
+                        <m:oMath xmlns:m="http://schemas.openxmlformats.org/officeDocument/2006/math">
+                          <m:sSub>
+                            <m:sSubPr>
+                              <m:ctrlPr>
+                                <a:rPr lang="en-US" sz="1600" i="1" smtClean="0">
+                                  <a:latin typeface="Cambria Math" charset="0"/>
+                                </a:rPr>
+                              </m:ctrlPr>
+                            </m:sSubPr>
+                            <m:e>
+                              <m:r>
+                                <a:rPr lang="en-US" sz="1600" i="1">
+                                  <a:latin typeface="Cambria Math" charset="0"/>
+                                </a:rPr>
+                                <m:t>𝑙</m:t>
+                              </m:r>
+                            </m:e>
+                            <m:sub>
+                              <m:r>
+                                <a:rPr lang="en-US" sz="1600" b="0" i="1" smtClean="0">
+                                  <a:latin typeface="Cambria Math" charset="0"/>
+                                </a:rPr>
+                                <m:t>𝐶</m:t>
+                              </m:r>
+                            </m:sub>
+                          </m:sSub>
+                        </m:oMath>
+                      </m:oMathPara>
+                    </a14:m>
+                    <a:endParaRPr lang="en-US" sz="1600" i="1" dirty="0">
+                      <a:latin typeface="Cambria Math" charset="0"/>
+                      <a:ea typeface="Cambria Math" charset="0"/>
+                      <a:cs typeface="Cambria Math" charset="0"/>
+                    </a:endParaRPr>
+                  </a:p>
+                </p:txBody>
+              </p:sp>
+            </mc:Choice>
+            <mc:Fallback>
+              <p:sp>
+                <p:nvSpPr>
+                  <p:cNvPr id="102" name="TextBox 101"/>
+                  <p:cNvSpPr txBox="1">
+                    <a:spLocks noRot="1" noChangeAspect="1" noMove="1" noResize="1" noEditPoints="1" noAdjustHandles="1" noChangeArrowheads="1" noChangeShapeType="1" noTextEdit="1"/>
+                  </p:cNvSpPr>
+                  <p:nvPr/>
+                </p:nvSpPr>
+                <p:spPr>
+                  <a:xfrm>
+                    <a:off x="6720802" y="3455833"/>
+                    <a:ext cx="400110" cy="338554"/>
+                  </a:xfrm>
+                  <a:prstGeom prst="rect">
+                    <a:avLst/>
+                  </a:prstGeom>
+                  <a:blipFill rotWithShape="0">
+                    <a:blip r:embed="rId4"/>
+                    <a:stretch>
+                      <a:fillRect b="-1818"/>
+                    </a:stretch>
+                  </a:blipFill>
+                </p:spPr>
+                <p:txBody>
+                  <a:bodyPr/>
+                  <a:lstStyle/>
+                  <a:p>
+                    <a:r>
+                      <a:rPr lang="en-US">
+                        <a:noFill/>
+                      </a:rPr>
+                      <a:t> </a:t>
+                    </a:r>
+                  </a:p>
+                </p:txBody>
+              </p:sp>
+            </mc:Fallback>
+          </mc:AlternateContent>
+          <mc:AlternateContent xmlns:mc="http://schemas.openxmlformats.org/markup-compatibility/2006">
+            <mc:Choice xmlns:a14="http://schemas.microsoft.com/office/drawing/2010/main" Requires="a14">
+              <p:sp>
+                <p:nvSpPr>
+                  <p:cNvPr id="137" name="TextBox 136"/>
+                  <p:cNvSpPr txBox="1"/>
+                  <p:nvPr/>
+                </p:nvSpPr>
+                <p:spPr>
+                  <a:xfrm>
+                    <a:off x="7520902" y="2719233"/>
+                    <a:ext cx="493918" cy="338554"/>
+                  </a:xfrm>
+                  <a:prstGeom prst="rect">
+                    <a:avLst/>
+                  </a:prstGeom>
+                  <a:noFill/>
+                </p:spPr>
+                <p:txBody>
+                  <a:bodyPr wrap="none" rtlCol="0">
+                    <a:spAutoFit/>
+                  </a:bodyPr>
+                  <a:lstStyle/>
+                  <a:p>
+                    <a:pPr/>
+                    <a14:m>
+                      <m:oMathPara xmlns:m="http://schemas.openxmlformats.org/officeDocument/2006/math">
+                        <m:oMathParaPr>
+                          <m:jc m:val="centerGroup"/>
+                        </m:oMathParaPr>
+                        <m:oMath xmlns:m="http://schemas.openxmlformats.org/officeDocument/2006/math">
+                          <m:sSub>
+                            <m:sSubPr>
+                              <m:ctrlPr>
+                                <a:rPr lang="en-US" sz="1600" i="1" smtClean="0">
+                                  <a:latin typeface="Cambria Math" charset="0"/>
+                                </a:rPr>
+                              </m:ctrlPr>
+                            </m:sSubPr>
+                            <m:e>
+                              <m:r>
+                                <a:rPr lang="en-US" sz="1600" i="1">
+                                  <a:latin typeface="Cambria Math" charset="0"/>
+                                </a:rPr>
+                                <m:t>𝑙</m:t>
+                              </m:r>
+                            </m:e>
+                            <m:sub>
+                              <m:r>
+                                <a:rPr lang="en-US" sz="1600" b="0" i="1" smtClean="0">
+                                  <a:latin typeface="Cambria Math" charset="0"/>
+                                </a:rPr>
+                                <m:t>𝐶</m:t>
+                              </m:r>
+                              <m:r>
+                                <a:rPr lang="en-US" sz="1600" b="0" i="1" smtClean="0">
+                                  <a:latin typeface="Cambria Math" charset="0"/>
+                                </a:rPr>
+                                <m:t>𝑢</m:t>
+                              </m:r>
+                            </m:sub>
+                          </m:sSub>
+                        </m:oMath>
+                      </m:oMathPara>
+                    </a14:m>
+                    <a:endParaRPr lang="en-US" sz="1600" i="1" dirty="0">
+                      <a:latin typeface="Cambria Math" charset="0"/>
+                      <a:ea typeface="Cambria Math" charset="0"/>
+                      <a:cs typeface="Cambria Math" charset="0"/>
+                    </a:endParaRPr>
+                  </a:p>
+                </p:txBody>
+              </p:sp>
+            </mc:Choice>
+            <mc:Fallback>
+              <p:sp>
+                <p:nvSpPr>
+                  <p:cNvPr id="137" name="TextBox 136"/>
+                  <p:cNvSpPr txBox="1">
+                    <a:spLocks noRot="1" noChangeAspect="1" noMove="1" noResize="1" noEditPoints="1" noAdjustHandles="1" noChangeArrowheads="1" noChangeShapeType="1" noTextEdit="1"/>
+                  </p:cNvSpPr>
+                  <p:nvPr/>
+                </p:nvSpPr>
+                <p:spPr>
+                  <a:xfrm>
+                    <a:off x="7520902" y="2719233"/>
+                    <a:ext cx="493918" cy="338554"/>
+                  </a:xfrm>
+                  <a:prstGeom prst="rect">
+                    <a:avLst/>
+                  </a:prstGeom>
+                  <a:blipFill rotWithShape="0">
+                    <a:blip r:embed="rId5"/>
+                    <a:stretch>
+                      <a:fillRect/>
+                    </a:stretch>
+                  </a:blipFill>
+                </p:spPr>
+                <p:txBody>
+                  <a:bodyPr/>
+                  <a:lstStyle/>
+                  <a:p>
+                    <a:r>
+                      <a:rPr lang="en-US">
+                        <a:noFill/>
+                      </a:rPr>
+                      <a:t> </a:t>
+                    </a:r>
+                  </a:p>
+                </p:txBody>
+              </p:sp>
+            </mc:Fallback>
+          </mc:AlternateContent>
+          <mc:AlternateContent xmlns:mc="http://schemas.openxmlformats.org/markup-compatibility/2006">
+            <mc:Choice xmlns:a14="http://schemas.microsoft.com/office/drawing/2010/main" Requires="a14">
+              <p:sp>
+                <p:nvSpPr>
+                  <p:cNvPr id="144" name="TextBox 143"/>
+                  <p:cNvSpPr txBox="1"/>
+                  <p:nvPr/>
+                </p:nvSpPr>
+                <p:spPr>
+                  <a:xfrm>
+                    <a:off x="8562302" y="4802033"/>
+                    <a:ext cx="351763" cy="338554"/>
+                  </a:xfrm>
+                  <a:prstGeom prst="rect">
+                    <a:avLst/>
+                  </a:prstGeom>
+                  <a:noFill/>
+                </p:spPr>
+                <p:txBody>
+                  <a:bodyPr wrap="none" rtlCol="0">
+                    <a:spAutoFit/>
+                  </a:bodyPr>
+                  <a:lstStyle/>
+                  <a:p>
+                    <a:pPr/>
+                    <a14:m>
+                      <m:oMathPara xmlns:m="http://schemas.openxmlformats.org/officeDocument/2006/math">
+                        <m:oMathParaPr>
+                          <m:jc m:val="centerGroup"/>
+                        </m:oMathParaPr>
+                        <m:oMath xmlns:m="http://schemas.openxmlformats.org/officeDocument/2006/math">
+                          <m:r>
+                            <a:rPr lang="en-US" sz="1600" b="0" i="1" smtClean="0">
+                              <a:latin typeface="Cambria Math" charset="0"/>
+                            </a:rPr>
+                            <m:t>𝑢</m:t>
+                          </m:r>
+                        </m:oMath>
+                      </m:oMathPara>
+                    </a14:m>
+                    <a:endParaRPr lang="en-US" sz="1600" i="1" dirty="0">
+                      <a:latin typeface="Cambria Math" charset="0"/>
+                      <a:ea typeface="Cambria Math" charset="0"/>
+                      <a:cs typeface="Cambria Math" charset="0"/>
+                    </a:endParaRPr>
+                  </a:p>
+                </p:txBody>
+              </p:sp>
+            </mc:Choice>
+            <mc:Fallback>
+              <p:sp>
+                <p:nvSpPr>
+                  <p:cNvPr id="144" name="TextBox 143"/>
+                  <p:cNvSpPr txBox="1">
+                    <a:spLocks noRot="1" noChangeAspect="1" noMove="1" noResize="1" noEditPoints="1" noAdjustHandles="1" noChangeArrowheads="1" noChangeShapeType="1" noTextEdit="1"/>
+                  </p:cNvSpPr>
+                  <p:nvPr/>
+                </p:nvSpPr>
+                <p:spPr>
+                  <a:xfrm>
+                    <a:off x="8562302" y="4802033"/>
+                    <a:ext cx="351763" cy="338554"/>
+                  </a:xfrm>
+                  <a:prstGeom prst="rect">
+                    <a:avLst/>
+                  </a:prstGeom>
+                  <a:blipFill rotWithShape="0">
+                    <a:blip r:embed="rId6"/>
+                    <a:stretch>
+                      <a:fillRect/>
+                    </a:stretch>
+                  </a:blipFill>
+                </p:spPr>
+                <p:txBody>
+                  <a:bodyPr/>
+                  <a:lstStyle/>
+                  <a:p>
+                    <a:r>
+                      <a:rPr lang="en-US">
+                        <a:noFill/>
+                      </a:rPr>
+                      <a:t> </a:t>
+                    </a:r>
+                  </a:p>
+                </p:txBody>
+              </p:sp>
+            </mc:Fallback>
+          </mc:AlternateContent>
+        </p:grpSp>
+        <p:sp>
+          <p:nvSpPr>
+            <p:cNvPr id="49" name="Oval 48"/>
+            <p:cNvSpPr/>
+            <p:nvPr/>
+          </p:nvSpPr>
+          <p:spPr>
+            <a:xfrm>
+              <a:off x="4983414" y="2814820"/>
+              <a:ext cx="144394" cy="144394"/>
+            </a:xfrm>
+            <a:prstGeom prst="ellipse">
+              <a:avLst/>
+            </a:prstGeom>
+            <a:noFill/>
+            <a:ln>
+              <a:solidFill>
+                <a:schemeClr val="tx1"/>
+              </a:solidFill>
+            </a:ln>
+            <a:effectLst/>
+          </p:spPr>
+          <p:style>
+            <a:lnRef idx="2">
+              <a:schemeClr val="accent1">
+                <a:shade val="50000"/>
+              </a:schemeClr>
+            </a:lnRef>
+            <a:fillRef idx="1">
+              <a:schemeClr val="accent1"/>
+            </a:fillRef>
+            <a:effectRef idx="0">
+              <a:schemeClr val="accent1"/>
+            </a:effectRef>
+            <a:fontRef idx="minor">
+              <a:schemeClr val="lt1"/>
+            </a:fontRef>
+          </p:style>
+          <p:txBody>
+            <a:bodyPr rtlCol="0" anchor="ctr"/>
+            <a:lstStyle/>
+            <a:p>
+              <a:pPr algn="ctr"/>
+              <a:endParaRPr lang="en-US"/>
+            </a:p>
+          </p:txBody>
+        </p:sp>
+        <p:sp>
+          <p:nvSpPr>
+            <p:cNvPr id="61" name="Oval 60"/>
+            <p:cNvSpPr/>
+            <p:nvPr/>
+          </p:nvSpPr>
+          <p:spPr>
+            <a:xfrm>
+              <a:off x="5974632" y="3452251"/>
+              <a:ext cx="144394" cy="144394"/>
+            </a:xfrm>
+            <a:prstGeom prst="ellipse">
+              <a:avLst/>
+            </a:prstGeom>
+            <a:noFill/>
+            <a:ln>
+              <a:solidFill>
+                <a:schemeClr val="tx1"/>
+              </a:solidFill>
+            </a:ln>
+            <a:effectLst/>
+          </p:spPr>
+          <p:style>
+            <a:lnRef idx="2">
+              <a:schemeClr val="accent1">
+                <a:shade val="50000"/>
+              </a:schemeClr>
+            </a:lnRef>
+            <a:fillRef idx="1">
+              <a:schemeClr val="accent1"/>
+            </a:fillRef>
+            <a:effectRef idx="0">
+              <a:schemeClr val="accent1"/>
+            </a:effectRef>
+            <a:fontRef idx="minor">
+              <a:schemeClr val="lt1"/>
+            </a:fontRef>
+          </p:style>
+          <p:txBody>
+            <a:bodyPr rtlCol="0" anchor="ctr"/>
+            <a:lstStyle/>
+            <a:p>
+              <a:pPr algn="ctr"/>
+              <a:endParaRPr lang="en-US"/>
+            </a:p>
+          </p:txBody>
+        </p:sp>
+        <p:sp>
+          <p:nvSpPr>
+            <p:cNvPr id="62" name="Oval 61"/>
+            <p:cNvSpPr/>
+            <p:nvPr/>
+          </p:nvSpPr>
+          <p:spPr>
+            <a:xfrm>
+              <a:off x="6537324" y="2822221"/>
+              <a:ext cx="144394" cy="144394"/>
+            </a:xfrm>
+            <a:prstGeom prst="ellipse">
+              <a:avLst/>
+            </a:prstGeom>
+            <a:noFill/>
+            <a:ln>
+              <a:solidFill>
+                <a:schemeClr val="tx1"/>
+              </a:solidFill>
+            </a:ln>
+            <a:effectLst/>
+          </p:spPr>
+          <p:style>
+            <a:lnRef idx="2">
+              <a:schemeClr val="accent1">
+                <a:shade val="50000"/>
+              </a:schemeClr>
+            </a:lnRef>
+            <a:fillRef idx="1">
+              <a:schemeClr val="accent1"/>
+            </a:fillRef>
+            <a:effectRef idx="0">
+              <a:schemeClr val="accent1"/>
+            </a:effectRef>
+            <a:fontRef idx="minor">
+              <a:schemeClr val="lt1"/>
+            </a:fontRef>
+          </p:style>
+          <p:txBody>
+            <a:bodyPr rtlCol="0" anchor="ctr"/>
+            <a:lstStyle/>
+            <a:p>
+              <a:pPr algn="ctr"/>
+              <a:endParaRPr lang="en-US"/>
+            </a:p>
+          </p:txBody>
+        </p:sp>
+        <p:sp>
+          <p:nvSpPr>
+            <p:cNvPr id="63" name="Rectangle 62"/>
+            <p:cNvSpPr/>
+            <p:nvPr/>
+          </p:nvSpPr>
+          <p:spPr>
+            <a:xfrm>
+              <a:off x="5773321" y="2816465"/>
+              <a:ext cx="145774" cy="145774"/>
+            </a:xfrm>
+            <a:prstGeom prst="rect">
+              <a:avLst/>
+            </a:prstGeom>
+            <a:noFill/>
+            <a:ln>
+              <a:solidFill>
+                <a:schemeClr val="tx1"/>
+              </a:solidFill>
+            </a:ln>
+          </p:spPr>
+          <p:style>
+            <a:lnRef idx="2">
+              <a:schemeClr val="accent1">
+                <a:shade val="50000"/>
+              </a:schemeClr>
+            </a:lnRef>
+            <a:fillRef idx="1">
+              <a:schemeClr val="accent1"/>
+            </a:fillRef>
+            <a:effectRef idx="0">
+              <a:schemeClr val="accent1"/>
+            </a:effectRef>
+            <a:fontRef idx="minor">
+              <a:schemeClr val="lt1"/>
+            </a:fontRef>
+          </p:style>
+          <p:txBody>
+            <a:bodyPr rtlCol="0" anchor="ctr"/>
+            <a:lstStyle/>
+            <a:p>
+              <a:pPr algn="ctr"/>
+              <a:endParaRPr lang="en-US"/>
+            </a:p>
+          </p:txBody>
+        </p:sp>
+        <p:sp>
+          <p:nvSpPr>
+            <p:cNvPr id="64" name="Rectangle 63"/>
+            <p:cNvSpPr/>
+            <p:nvPr/>
+          </p:nvSpPr>
+          <p:spPr>
+            <a:xfrm>
+              <a:off x="6161124" y="2165480"/>
+              <a:ext cx="145774" cy="145774"/>
+            </a:xfrm>
+            <a:prstGeom prst="rect">
+              <a:avLst/>
+            </a:prstGeom>
+            <a:noFill/>
+            <a:ln>
+              <a:solidFill>
+                <a:schemeClr val="tx1"/>
+              </a:solidFill>
+            </a:ln>
+          </p:spPr>
+          <p:style>
+            <a:lnRef idx="2">
+              <a:schemeClr val="accent1">
+                <a:shade val="50000"/>
+              </a:schemeClr>
+            </a:lnRef>
+            <a:fillRef idx="1">
+              <a:schemeClr val="accent1"/>
+            </a:fillRef>
+            <a:effectRef idx="0">
+              <a:schemeClr val="accent1"/>
+            </a:effectRef>
+            <a:fontRef idx="minor">
+              <a:schemeClr val="lt1"/>
+            </a:fontRef>
+          </p:style>
+          <p:txBody>
+            <a:bodyPr rtlCol="0" anchor="ctr"/>
+            <a:lstStyle/>
+            <a:p>
+              <a:pPr algn="ctr"/>
+              <a:endParaRPr lang="en-US"/>
+            </a:p>
+          </p:txBody>
+        </p:sp>
+        <p:sp>
+          <p:nvSpPr>
+            <p:cNvPr id="65" name="Rectangle 64"/>
+            <p:cNvSpPr/>
+            <p:nvPr/>
+          </p:nvSpPr>
+          <p:spPr>
+            <a:xfrm>
+              <a:off x="5186658" y="2172159"/>
+              <a:ext cx="145774" cy="145774"/>
+            </a:xfrm>
+            <a:prstGeom prst="rect">
+              <a:avLst/>
+            </a:prstGeom>
+            <a:noFill/>
+            <a:ln>
+              <a:solidFill>
+                <a:schemeClr val="tx1"/>
+              </a:solidFill>
+            </a:ln>
+          </p:spPr>
+          <p:style>
+            <a:lnRef idx="2">
+              <a:schemeClr val="accent1">
+                <a:shade val="50000"/>
+              </a:schemeClr>
+            </a:lnRef>
+            <a:fillRef idx="1">
+              <a:schemeClr val="accent1"/>
+            </a:fillRef>
+            <a:effectRef idx="0">
+              <a:schemeClr val="accent1"/>
+            </a:effectRef>
+            <a:fontRef idx="minor">
+              <a:schemeClr val="lt1"/>
+            </a:fontRef>
+          </p:style>
+          <p:txBody>
+            <a:bodyPr rtlCol="0" anchor="ctr"/>
+            <a:lstStyle/>
+            <a:p>
+              <a:pPr algn="ctr"/>
+              <a:endParaRPr lang="en-US"/>
+            </a:p>
+          </p:txBody>
+        </p:sp>
+        <p:sp>
+          <p:nvSpPr>
+            <p:cNvPr id="138" name="Oval 137"/>
+            <p:cNvSpPr/>
+            <p:nvPr/>
+          </p:nvSpPr>
+          <p:spPr>
+            <a:xfrm>
+              <a:off x="7515224" y="2809521"/>
+              <a:ext cx="144394" cy="144394"/>
+            </a:xfrm>
+            <a:prstGeom prst="ellipse">
+              <a:avLst/>
+            </a:prstGeom>
+            <a:noFill/>
+            <a:ln>
+              <a:solidFill>
+                <a:schemeClr val="tx1"/>
+              </a:solidFill>
+            </a:ln>
+            <a:effectLst/>
+          </p:spPr>
+          <p:style>
+            <a:lnRef idx="2">
+              <a:schemeClr val="accent1">
+                <a:shade val="50000"/>
+              </a:schemeClr>
+            </a:lnRef>
+            <a:fillRef idx="1">
+              <a:schemeClr val="accent1"/>
+            </a:fillRef>
+            <a:effectRef idx="0">
+              <a:schemeClr val="accent1"/>
+            </a:effectRef>
+            <a:fontRef idx="minor">
+              <a:schemeClr val="lt1"/>
+            </a:fontRef>
+          </p:style>
+          <p:txBody>
+            <a:bodyPr rtlCol="0" anchor="ctr"/>
+            <a:lstStyle/>
+            <a:p>
+              <a:pPr algn="ctr"/>
+              <a:endParaRPr lang="en-US"/>
+            </a:p>
+          </p:txBody>
+        </p:sp>
+        <p:sp>
+          <p:nvSpPr>
+            <p:cNvPr id="139" name="Rectangle 138"/>
+            <p:cNvSpPr/>
+            <p:nvPr/>
+          </p:nvSpPr>
+          <p:spPr>
+            <a:xfrm>
+              <a:off x="7891758" y="2159459"/>
+              <a:ext cx="145774" cy="145774"/>
+            </a:xfrm>
+            <a:prstGeom prst="rect">
+              <a:avLst/>
+            </a:prstGeom>
+            <a:noFill/>
+            <a:ln>
+              <a:solidFill>
+                <a:schemeClr val="tx1"/>
+              </a:solidFill>
+            </a:ln>
+          </p:spPr>
+          <p:style>
+            <a:lnRef idx="2">
+              <a:schemeClr val="accent1">
+                <a:shade val="50000"/>
+              </a:schemeClr>
+            </a:lnRef>
+            <a:fillRef idx="1">
+              <a:schemeClr val="accent1"/>
+            </a:fillRef>
+            <a:effectRef idx="0">
+              <a:schemeClr val="accent1"/>
+            </a:effectRef>
+            <a:fontRef idx="minor">
+              <a:schemeClr val="lt1"/>
+            </a:fontRef>
+          </p:style>
+          <p:txBody>
+            <a:bodyPr rtlCol="0" anchor="ctr"/>
+            <a:lstStyle/>
+            <a:p>
+              <a:pPr algn="ctr"/>
+              <a:endParaRPr lang="en-US"/>
+            </a:p>
+          </p:txBody>
+        </p:sp>
+        <p:sp>
+          <p:nvSpPr>
+            <p:cNvPr id="140" name="Rectangle 139"/>
+            <p:cNvSpPr/>
+            <p:nvPr/>
+          </p:nvSpPr>
+          <p:spPr>
+            <a:xfrm>
+              <a:off x="7421858" y="1537159"/>
+              <a:ext cx="145774" cy="145774"/>
+            </a:xfrm>
+            <a:prstGeom prst="rect">
+              <a:avLst/>
+            </a:prstGeom>
+            <a:noFill/>
+            <a:ln>
+              <a:solidFill>
+                <a:schemeClr val="tx1"/>
+              </a:solidFill>
+            </a:ln>
+          </p:spPr>
+          <p:style>
+            <a:lnRef idx="2">
+              <a:schemeClr val="accent1">
+                <a:shade val="50000"/>
+              </a:schemeClr>
+            </a:lnRef>
+            <a:fillRef idx="1">
+              <a:schemeClr val="accent1"/>
+            </a:fillRef>
+            <a:effectRef idx="0">
+              <a:schemeClr val="accent1"/>
+            </a:effectRef>
+            <a:fontRef idx="minor">
+              <a:schemeClr val="lt1"/>
+            </a:fontRef>
+          </p:style>
+          <p:txBody>
+            <a:bodyPr rtlCol="0" anchor="ctr"/>
+            <a:lstStyle/>
+            <a:p>
+              <a:pPr algn="ctr"/>
+              <a:endParaRPr lang="en-US"/>
+            </a:p>
+          </p:txBody>
+        </p:sp>
+        <p:sp>
+          <p:nvSpPr>
+            <p:cNvPr id="141" name="Rectangle 140"/>
+            <p:cNvSpPr/>
+            <p:nvPr/>
+          </p:nvSpPr>
+          <p:spPr>
+            <a:xfrm>
+              <a:off x="5694658" y="1549859"/>
+              <a:ext cx="145774" cy="145774"/>
+            </a:xfrm>
+            <a:prstGeom prst="rect">
+              <a:avLst/>
+            </a:prstGeom>
+            <a:noFill/>
+            <a:ln>
+              <a:solidFill>
+                <a:schemeClr val="tx1"/>
+              </a:solidFill>
+            </a:ln>
+          </p:spPr>
+          <p:style>
+            <a:lnRef idx="2">
+              <a:schemeClr val="accent1">
+                <a:shade val="50000"/>
+              </a:schemeClr>
+            </a:lnRef>
+            <a:fillRef idx="1">
+              <a:schemeClr val="accent1"/>
+            </a:fillRef>
+            <a:effectRef idx="0">
+              <a:schemeClr val="accent1"/>
+            </a:effectRef>
+            <a:fontRef idx="minor">
+              <a:schemeClr val="lt1"/>
+            </a:fontRef>
+          </p:style>
+          <p:txBody>
+            <a:bodyPr rtlCol="0" anchor="ctr"/>
+            <a:lstStyle/>
+            <a:p>
+              <a:pPr algn="ctr"/>
+              <a:endParaRPr lang="en-US"/>
+            </a:p>
+          </p:txBody>
+        </p:sp>
+      </p:grpSp>
+      <p:sp>
+        <p:nvSpPr>
+          <p:cNvPr id="142" name="TextBox 141"/>
+          <p:cNvSpPr txBox="1"/>
+          <p:nvPr/>
+        </p:nvSpPr>
+        <p:spPr>
+          <a:xfrm>
+            <a:off x="2955051" y="902878"/>
+            <a:ext cx="436338" cy="369332"/>
+          </a:xfrm>
+          <a:prstGeom prst="rect">
+            <a:avLst/>
+          </a:prstGeom>
+          <a:noFill/>
+        </p:spPr>
+        <p:txBody>
+          <a:bodyPr wrap="none" rtlCol="0">
+            <a:spAutoFit/>
+          </a:bodyPr>
+          <a:lstStyle/>
+          <a:p>
+            <a:r>
+              <a:rPr lang="en-US" dirty="0"/>
+              <a:t>(a)</a:t>
+            </a:r>
+          </a:p>
+        </p:txBody>
+      </p:sp>
+      <p:sp>
+        <p:nvSpPr>
+          <p:cNvPr id="143" name="TextBox 142"/>
+          <p:cNvSpPr txBox="1"/>
+          <p:nvPr/>
+        </p:nvSpPr>
+        <p:spPr>
+          <a:xfrm>
+            <a:off x="7150186" y="902878"/>
+            <a:ext cx="447558" cy="369332"/>
+          </a:xfrm>
+          <a:prstGeom prst="rect">
+            <a:avLst/>
+          </a:prstGeom>
+          <a:noFill/>
+        </p:spPr>
+        <p:txBody>
+          <a:bodyPr wrap="none" rtlCol="0">
+            <a:spAutoFit/>
+          </a:bodyPr>
+          <a:lstStyle/>
+          <a:p>
+            <a:r>
+              <a:rPr lang="en-US" dirty="0"/>
+              <a:t>(b)</a:t>
+            </a:r>
+          </a:p>
+        </p:txBody>
+      </p:sp>
     </p:spTree>
     <p:extLst>
       <p:ext uri="{BB962C8B-B14F-4D97-AF65-F5344CB8AC3E}">
@@ -43138,11 +45206,6 @@
               </a:rPr>
               <a:t>4</a:t>
             </a:r>
-            <a:endParaRPr lang="en-US" sz="1600" dirty="0">
-              <a:latin typeface="Apple Chancery" charset="0"/>
-              <a:ea typeface="Apple Chancery" charset="0"/>
-              <a:cs typeface="Apple Chancery" charset="0"/>
-            </a:endParaRPr>
           </a:p>
         </p:txBody>
       </p:sp>
@@ -43176,11 +45239,6 @@
               </a:rPr>
               <a:t>2</a:t>
             </a:r>
-            <a:endParaRPr lang="en-US" sz="1600" dirty="0">
-              <a:latin typeface="Apple Chancery" charset="0"/>
-              <a:ea typeface="Apple Chancery" charset="0"/>
-              <a:cs typeface="Apple Chancery" charset="0"/>
-            </a:endParaRPr>
           </a:p>
         </p:txBody>
       </p:sp>
@@ -43214,11 +45272,6 @@
               </a:rPr>
               <a:t>6</a:t>
             </a:r>
-            <a:endParaRPr lang="en-US" sz="1600" dirty="0">
-              <a:latin typeface="Apple Chancery" charset="0"/>
-              <a:ea typeface="Apple Chancery" charset="0"/>
-              <a:cs typeface="Apple Chancery" charset="0"/>
-            </a:endParaRPr>
           </a:p>
         </p:txBody>
       </p:sp>
@@ -43285,11 +45338,6 @@
               </a:rPr>
               <a:t>7</a:t>
             </a:r>
-            <a:endParaRPr lang="en-US" sz="1600" dirty="0">
-              <a:latin typeface="Apple Chancery" charset="0"/>
-              <a:ea typeface="Apple Chancery" charset="0"/>
-              <a:cs typeface="Apple Chancery" charset="0"/>
-            </a:endParaRPr>
           </a:p>
         </p:txBody>
       </p:sp>
@@ -43566,11 +45614,6 @@
               </a:rPr>
               <a:t>4</a:t>
             </a:r>
-            <a:endParaRPr lang="en-US" sz="1600" dirty="0">
-              <a:latin typeface="Apple Chancery" charset="0"/>
-              <a:ea typeface="Apple Chancery" charset="0"/>
-              <a:cs typeface="Apple Chancery" charset="0"/>
-            </a:endParaRPr>
           </a:p>
         </p:txBody>
       </p:sp>
@@ -43604,11 +45647,6 @@
               </a:rPr>
               <a:t>5</a:t>
             </a:r>
-            <a:endParaRPr lang="en-US" sz="1600" dirty="0">
-              <a:latin typeface="Apple Chancery" charset="0"/>
-              <a:ea typeface="Apple Chancery" charset="0"/>
-              <a:cs typeface="Apple Chancery" charset="0"/>
-            </a:endParaRPr>
           </a:p>
         </p:txBody>
       </p:sp>
@@ -43642,11 +45680,6 @@
               </a:rPr>
               <a:t>3</a:t>
             </a:r>
-            <a:endParaRPr lang="en-US" sz="1600" dirty="0">
-              <a:latin typeface="Apple Chancery" charset="0"/>
-              <a:ea typeface="Apple Chancery" charset="0"/>
-              <a:cs typeface="Apple Chancery" charset="0"/>
-            </a:endParaRPr>
           </a:p>
         </p:txBody>
       </p:sp>
@@ -43713,11 +45746,6 @@
               </a:rPr>
               <a:t>6</a:t>
             </a:r>
-            <a:endParaRPr lang="en-US" sz="1600" dirty="0">
-              <a:latin typeface="Apple Chancery" charset="0"/>
-              <a:ea typeface="Apple Chancery" charset="0"/>
-              <a:cs typeface="Apple Chancery" charset="0"/>
-            </a:endParaRPr>
           </a:p>
         </p:txBody>
       </p:sp>
@@ -43784,11 +45812,6 @@
               </a:rPr>
               <a:t>4</a:t>
             </a:r>
-            <a:endParaRPr lang="en-US" sz="1600" dirty="0">
-              <a:latin typeface="Apple Chancery" charset="0"/>
-              <a:ea typeface="Apple Chancery" charset="0"/>
-              <a:cs typeface="Apple Chancery" charset="0"/>
-            </a:endParaRPr>
           </a:p>
         </p:txBody>
       </p:sp>
@@ -43855,11 +45878,6 @@
               </a:rPr>
               <a:t>7</a:t>
             </a:r>
-            <a:endParaRPr lang="en-US" sz="1600" dirty="0">
-              <a:latin typeface="Apple Chancery" charset="0"/>
-              <a:ea typeface="Apple Chancery" charset="0"/>
-              <a:cs typeface="Apple Chancery" charset="0"/>
-            </a:endParaRPr>
           </a:p>
         </p:txBody>
       </p:sp>

</xml_diff>

<commit_message>
Add scenario 2 tables
</commit_message>
<xml_diff>
--- a/interim_report/images/graphs.pptx
+++ b/interim_report/images/graphs.pptx
@@ -43157,8 +43157,8 @@
                 </p:nvSpPr>
                 <p:spPr>
                   <a:xfrm>
-                    <a:off x="8562302" y="4802033"/>
-                    <a:ext cx="351763" cy="338554"/>
+                    <a:off x="8362489" y="4637272"/>
+                    <a:ext cx="737894" cy="338554"/>
                   </a:xfrm>
                   <a:prstGeom prst="rect">
                     <a:avLst/>
@@ -43184,6 +43184,18 @@
                             </a:rPr>
                             <m:t>𝑢</m:t>
                           </m:r>
+                          <m:r>
+                            <a:rPr lang="en-US" sz="1600" b="0" i="1" smtClean="0">
+                              <a:latin typeface="Cambria Math" charset="0"/>
+                            </a:rPr>
+                            <m:t>=</m:t>
+                          </m:r>
+                          <m:r>
+                            <a:rPr lang="en-US" sz="1600" b="0" i="1" smtClean="0">
+                              <a:latin typeface="Cambria Math" charset="0"/>
+                            </a:rPr>
+                            <m:t>𝑣</m:t>
+                          </m:r>
                         </m:oMath>
                       </m:oMathPara>
                     </a14:m>
@@ -43207,8 +43219,8 @@
                 </p:nvSpPr>
                 <p:spPr>
                   <a:xfrm>
-                    <a:off x="8562302" y="4802033"/>
-                    <a:ext cx="351763" cy="338554"/>
+                    <a:off x="8362489" y="4637272"/>
+                    <a:ext cx="737894" cy="338554"/>
                   </a:xfrm>
                   <a:prstGeom prst="rect">
                     <a:avLst/>

</xml_diff>

<commit_message>
Use forest, move operation definitions to earlier section
</commit_message>
<xml_diff>
--- a/interim_report/images/graphs.pptx
+++ b/interim_report/images/graphs.pptx
@@ -209,7 +209,7 @@
           <a:p>
             <a:fld id="{5ADE0F42-1EB1-C14E-B881-EB65E9D225AC}" type="datetimeFigureOut">
               <a:rPr lang="en-US" smtClean="0"/>
-              <a:t>4/1/19</a:t>
+              <a:t>4/4/19</a:t>
             </a:fld>
             <a:endParaRPr lang="en-US"/>
           </a:p>
@@ -1818,7 +1818,7 @@
           <a:p>
             <a:fld id="{75DCEA96-0148-464D-8045-BBEB0C835C6A}" type="datetimeFigureOut">
               <a:rPr lang="en-US" smtClean="0"/>
-              <a:t>4/1/19</a:t>
+              <a:t>4/4/19</a:t>
             </a:fld>
             <a:endParaRPr lang="en-US"/>
           </a:p>
@@ -1983,7 +1983,7 @@
           <a:p>
             <a:fld id="{75DCEA96-0148-464D-8045-BBEB0C835C6A}" type="datetimeFigureOut">
               <a:rPr lang="en-US" smtClean="0"/>
-              <a:t>4/1/19</a:t>
+              <a:t>4/4/19</a:t>
             </a:fld>
             <a:endParaRPr lang="en-US"/>
           </a:p>
@@ -2158,7 +2158,7 @@
           <a:p>
             <a:fld id="{75DCEA96-0148-464D-8045-BBEB0C835C6A}" type="datetimeFigureOut">
               <a:rPr lang="en-US" smtClean="0"/>
-              <a:t>4/1/19</a:t>
+              <a:t>4/4/19</a:t>
             </a:fld>
             <a:endParaRPr lang="en-US"/>
           </a:p>
@@ -2323,7 +2323,7 @@
           <a:p>
             <a:fld id="{75DCEA96-0148-464D-8045-BBEB0C835C6A}" type="datetimeFigureOut">
               <a:rPr lang="en-US" smtClean="0"/>
-              <a:t>4/1/19</a:t>
+              <a:t>4/4/19</a:t>
             </a:fld>
             <a:endParaRPr lang="en-US"/>
           </a:p>
@@ -2564,7 +2564,7 @@
           <a:p>
             <a:fld id="{75DCEA96-0148-464D-8045-BBEB0C835C6A}" type="datetimeFigureOut">
               <a:rPr lang="en-US" smtClean="0"/>
-              <a:t>4/1/19</a:t>
+              <a:t>4/4/19</a:t>
             </a:fld>
             <a:endParaRPr lang="en-US"/>
           </a:p>
@@ -2791,7 +2791,7 @@
           <a:p>
             <a:fld id="{75DCEA96-0148-464D-8045-BBEB0C835C6A}" type="datetimeFigureOut">
               <a:rPr lang="en-US" smtClean="0"/>
-              <a:t>4/1/19</a:t>
+              <a:t>4/4/19</a:t>
             </a:fld>
             <a:endParaRPr lang="en-US"/>
           </a:p>
@@ -3153,7 +3153,7 @@
           <a:p>
             <a:fld id="{75DCEA96-0148-464D-8045-BBEB0C835C6A}" type="datetimeFigureOut">
               <a:rPr lang="en-US" smtClean="0"/>
-              <a:t>4/1/19</a:t>
+              <a:t>4/4/19</a:t>
             </a:fld>
             <a:endParaRPr lang="en-US"/>
           </a:p>
@@ -3266,7 +3266,7 @@
           <a:p>
             <a:fld id="{75DCEA96-0148-464D-8045-BBEB0C835C6A}" type="datetimeFigureOut">
               <a:rPr lang="en-US" smtClean="0"/>
-              <a:t>4/1/19</a:t>
+              <a:t>4/4/19</a:t>
             </a:fld>
             <a:endParaRPr lang="en-US"/>
           </a:p>
@@ -3356,7 +3356,7 @@
           <a:p>
             <a:fld id="{75DCEA96-0148-464D-8045-BBEB0C835C6A}" type="datetimeFigureOut">
               <a:rPr lang="en-US" smtClean="0"/>
-              <a:t>4/1/19</a:t>
+              <a:t>4/4/19</a:t>
             </a:fld>
             <a:endParaRPr lang="en-US"/>
           </a:p>
@@ -3628,7 +3628,7 @@
           <a:p>
             <a:fld id="{75DCEA96-0148-464D-8045-BBEB0C835C6A}" type="datetimeFigureOut">
               <a:rPr lang="en-US" smtClean="0"/>
-              <a:t>4/1/19</a:t>
+              <a:t>4/4/19</a:t>
             </a:fld>
             <a:endParaRPr lang="en-US"/>
           </a:p>
@@ -3880,7 +3880,7 @@
           <a:p>
             <a:fld id="{75DCEA96-0148-464D-8045-BBEB0C835C6A}" type="datetimeFigureOut">
               <a:rPr lang="en-US" smtClean="0"/>
-              <a:t>4/1/19</a:t>
+              <a:t>4/4/19</a:t>
             </a:fld>
             <a:endParaRPr lang="en-US"/>
           </a:p>
@@ -4088,7 +4088,7 @@
           <a:p>
             <a:fld id="{75DCEA96-0148-464D-8045-BBEB0C835C6A}" type="datetimeFigureOut">
               <a:rPr lang="en-US" smtClean="0"/>
-              <a:t>4/1/19</a:t>
+              <a:t>4/4/19</a:t>
             </a:fld>
             <a:endParaRPr lang="en-US"/>
           </a:p>
@@ -8837,1423 +8837,13 @@
       </p:sp>
       <p:grpSp>
         <p:nvGrpSpPr>
-          <p:cNvPr id="170" name="Group 169"/>
+          <p:cNvPr id="212" name="Group 211"/>
           <p:cNvGrpSpPr/>
           <p:nvPr/>
         </p:nvGrpSpPr>
         <p:grpSpPr>
           <a:xfrm>
-            <a:off x="4658680" y="1099619"/>
-            <a:ext cx="4002406" cy="3717748"/>
-            <a:chOff x="4467540" y="885213"/>
-            <a:chExt cx="4002406" cy="3717748"/>
-          </a:xfrm>
-        </p:grpSpPr>
-        <p:grpSp>
-          <p:nvGrpSpPr>
-            <p:cNvPr id="171" name="Group 170"/>
-            <p:cNvGrpSpPr/>
-            <p:nvPr/>
-          </p:nvGrpSpPr>
-          <p:grpSpPr>
-            <a:xfrm>
-              <a:off x="4467540" y="885213"/>
-              <a:ext cx="4002406" cy="3717748"/>
-              <a:chOff x="5819262" y="3005561"/>
-              <a:chExt cx="4002406" cy="3717748"/>
-            </a:xfrm>
-          </p:grpSpPr>
-          <p:grpSp>
-            <p:nvGrpSpPr>
-              <p:cNvPr id="175" name="Group 174"/>
-              <p:cNvGrpSpPr/>
-              <p:nvPr/>
-            </p:nvGrpSpPr>
-            <p:grpSpPr>
-              <a:xfrm>
-                <a:off x="5980512" y="3005561"/>
-                <a:ext cx="3724778" cy="3293155"/>
-                <a:chOff x="5980512" y="3005561"/>
-                <a:chExt cx="3724778" cy="3293155"/>
-              </a:xfrm>
-            </p:grpSpPr>
-            <p:cxnSp>
-              <p:nvCxnSpPr>
-                <p:cNvPr id="188" name="Straight Connector 187"/>
-                <p:cNvCxnSpPr/>
-                <p:nvPr/>
-              </p:nvCxnSpPr>
-              <p:spPr>
-                <a:xfrm flipV="1">
-                  <a:off x="6991048" y="5015320"/>
-                  <a:ext cx="215346" cy="629476"/>
-                </a:xfrm>
-                <a:prstGeom prst="line">
-                  <a:avLst/>
-                </a:prstGeom>
-                <a:ln>
-                  <a:solidFill>
-                    <a:schemeClr val="tx1"/>
-                  </a:solidFill>
-                  <a:headEnd type="oval"/>
-                  <a:tailEnd type="none"/>
-                </a:ln>
-              </p:spPr>
-              <p:style>
-                <a:lnRef idx="1">
-                  <a:schemeClr val="accent1"/>
-                </a:lnRef>
-                <a:fillRef idx="0">
-                  <a:schemeClr val="accent1"/>
-                </a:fillRef>
-                <a:effectRef idx="0">
-                  <a:schemeClr val="accent1"/>
-                </a:effectRef>
-                <a:fontRef idx="minor">
-                  <a:schemeClr val="tx1"/>
-                </a:fontRef>
-              </p:style>
-            </p:cxnSp>
-            <p:cxnSp>
-              <p:nvCxnSpPr>
-                <p:cNvPr id="189" name="Straight Connector 188"/>
-                <p:cNvCxnSpPr/>
-                <p:nvPr/>
-              </p:nvCxnSpPr>
-              <p:spPr>
-                <a:xfrm>
-                  <a:off x="7206394" y="5015319"/>
-                  <a:ext cx="192157" cy="629477"/>
-                </a:xfrm>
-                <a:prstGeom prst="line">
-                  <a:avLst/>
-                </a:prstGeom>
-                <a:ln>
-                  <a:solidFill>
-                    <a:schemeClr val="tx1"/>
-                  </a:solidFill>
-                  <a:headEnd type="none"/>
-                  <a:tailEnd type="oval"/>
-                </a:ln>
-              </p:spPr>
-              <p:style>
-                <a:lnRef idx="1">
-                  <a:schemeClr val="accent1"/>
-                </a:lnRef>
-                <a:fillRef idx="0">
-                  <a:schemeClr val="accent1"/>
-                </a:fillRef>
-                <a:effectRef idx="0">
-                  <a:schemeClr val="accent1"/>
-                </a:effectRef>
-                <a:fontRef idx="minor">
-                  <a:schemeClr val="tx1"/>
-                </a:fontRef>
-              </p:style>
-            </p:cxnSp>
-            <p:cxnSp>
-              <p:nvCxnSpPr>
-                <p:cNvPr id="190" name="Straight Connector 189"/>
-                <p:cNvCxnSpPr/>
-                <p:nvPr/>
-              </p:nvCxnSpPr>
-              <p:spPr>
-                <a:xfrm flipV="1">
-                  <a:off x="7199578" y="4377141"/>
-                  <a:ext cx="384313" cy="629477"/>
-                </a:xfrm>
-                <a:prstGeom prst="line">
-                  <a:avLst/>
-                </a:prstGeom>
-                <a:ln>
-                  <a:solidFill>
-                    <a:schemeClr val="tx1"/>
-                  </a:solidFill>
-                  <a:headEnd type="oval"/>
-                  <a:tailEnd type="none"/>
-                </a:ln>
-              </p:spPr>
-              <p:style>
-                <a:lnRef idx="1">
-                  <a:schemeClr val="accent1"/>
-                </a:lnRef>
-                <a:fillRef idx="0">
-                  <a:schemeClr val="accent1"/>
-                </a:fillRef>
-                <a:effectRef idx="0">
-                  <a:schemeClr val="accent1"/>
-                </a:effectRef>
-                <a:fontRef idx="minor">
-                  <a:schemeClr val="tx1"/>
-                </a:fontRef>
-              </p:style>
-            </p:cxnSp>
-            <p:cxnSp>
-              <p:nvCxnSpPr>
-                <p:cNvPr id="191" name="Straight Connector 190"/>
-                <p:cNvCxnSpPr/>
-                <p:nvPr/>
-              </p:nvCxnSpPr>
-              <p:spPr>
-                <a:xfrm>
-                  <a:off x="7583890" y="4377141"/>
-                  <a:ext cx="384313" cy="629477"/>
-                </a:xfrm>
-                <a:prstGeom prst="line">
-                  <a:avLst/>
-                </a:prstGeom>
-                <a:ln>
-                  <a:solidFill>
-                    <a:schemeClr val="tx1"/>
-                  </a:solidFill>
-                  <a:headEnd type="none"/>
-                  <a:tailEnd type="oval"/>
-                </a:ln>
-              </p:spPr>
-              <p:style>
-                <a:lnRef idx="1">
-                  <a:schemeClr val="accent1"/>
-                </a:lnRef>
-                <a:fillRef idx="0">
-                  <a:schemeClr val="accent1"/>
-                </a:fillRef>
-                <a:effectRef idx="0">
-                  <a:schemeClr val="accent1"/>
-                </a:effectRef>
-                <a:fontRef idx="minor">
-                  <a:schemeClr val="tx1"/>
-                </a:fontRef>
-              </p:style>
-            </p:cxnSp>
-            <p:cxnSp>
-              <p:nvCxnSpPr>
-                <p:cNvPr id="192" name="Straight Connector 191"/>
-                <p:cNvCxnSpPr/>
-                <p:nvPr/>
-              </p:nvCxnSpPr>
-              <p:spPr>
-                <a:xfrm flipV="1">
-                  <a:off x="7749543" y="5015320"/>
-                  <a:ext cx="215346" cy="629476"/>
-                </a:xfrm>
-                <a:prstGeom prst="line">
-                  <a:avLst/>
-                </a:prstGeom>
-                <a:ln>
-                  <a:solidFill>
-                    <a:schemeClr val="tx1"/>
-                  </a:solidFill>
-                  <a:headEnd type="oval"/>
-                  <a:tailEnd type="none"/>
-                </a:ln>
-              </p:spPr>
-              <p:style>
-                <a:lnRef idx="1">
-                  <a:schemeClr val="accent1"/>
-                </a:lnRef>
-                <a:fillRef idx="0">
-                  <a:schemeClr val="accent1"/>
-                </a:fillRef>
-                <a:effectRef idx="0">
-                  <a:schemeClr val="accent1"/>
-                </a:effectRef>
-                <a:fontRef idx="minor">
-                  <a:schemeClr val="tx1"/>
-                </a:fontRef>
-              </p:style>
-            </p:cxnSp>
-            <p:cxnSp>
-              <p:nvCxnSpPr>
-                <p:cNvPr id="193" name="Straight Connector 192"/>
-                <p:cNvCxnSpPr/>
-                <p:nvPr/>
-              </p:nvCxnSpPr>
-              <p:spPr>
-                <a:xfrm>
-                  <a:off x="7964889" y="5015319"/>
-                  <a:ext cx="192157" cy="629477"/>
-                </a:xfrm>
-                <a:prstGeom prst="line">
-                  <a:avLst/>
-                </a:prstGeom>
-                <a:ln>
-                  <a:solidFill>
-                    <a:schemeClr val="tx1"/>
-                  </a:solidFill>
-                  <a:headEnd type="none"/>
-                  <a:tailEnd type="oval"/>
-                </a:ln>
-              </p:spPr>
-              <p:style>
-                <a:lnRef idx="1">
-                  <a:schemeClr val="accent1"/>
-                </a:lnRef>
-                <a:fillRef idx="0">
-                  <a:schemeClr val="accent1"/>
-                </a:fillRef>
-                <a:effectRef idx="0">
-                  <a:schemeClr val="accent1"/>
-                </a:effectRef>
-                <a:fontRef idx="minor">
-                  <a:schemeClr val="tx1"/>
-                </a:fontRef>
-              </p:style>
-            </p:cxnSp>
-            <p:cxnSp>
-              <p:nvCxnSpPr>
-                <p:cNvPr id="194" name="Straight Connector 193"/>
-                <p:cNvCxnSpPr/>
-                <p:nvPr/>
-              </p:nvCxnSpPr>
-              <p:spPr>
-                <a:xfrm flipV="1">
-                  <a:off x="6195858" y="5025045"/>
-                  <a:ext cx="215346" cy="629476"/>
-                </a:xfrm>
-                <a:prstGeom prst="line">
-                  <a:avLst/>
-                </a:prstGeom>
-                <a:ln>
-                  <a:solidFill>
-                    <a:schemeClr val="tx1"/>
-                  </a:solidFill>
-                  <a:headEnd type="oval"/>
-                  <a:tailEnd type="none"/>
-                </a:ln>
-              </p:spPr>
-              <p:style>
-                <a:lnRef idx="1">
-                  <a:schemeClr val="accent1"/>
-                </a:lnRef>
-                <a:fillRef idx="0">
-                  <a:schemeClr val="accent1"/>
-                </a:fillRef>
-                <a:effectRef idx="0">
-                  <a:schemeClr val="accent1"/>
-                </a:effectRef>
-                <a:fontRef idx="minor">
-                  <a:schemeClr val="tx1"/>
-                </a:fontRef>
-              </p:style>
-            </p:cxnSp>
-            <p:cxnSp>
-              <p:nvCxnSpPr>
-                <p:cNvPr id="195" name="Straight Connector 194"/>
-                <p:cNvCxnSpPr/>
-                <p:nvPr/>
-              </p:nvCxnSpPr>
-              <p:spPr>
-                <a:xfrm>
-                  <a:off x="6411204" y="5025044"/>
-                  <a:ext cx="192157" cy="629477"/>
-                </a:xfrm>
-                <a:prstGeom prst="line">
-                  <a:avLst/>
-                </a:prstGeom>
-                <a:ln>
-                  <a:solidFill>
-                    <a:schemeClr val="tx1"/>
-                  </a:solidFill>
-                  <a:headEnd type="none"/>
-                  <a:tailEnd type="oval"/>
-                </a:ln>
-              </p:spPr>
-              <p:style>
-                <a:lnRef idx="1">
-                  <a:schemeClr val="accent1"/>
-                </a:lnRef>
-                <a:fillRef idx="0">
-                  <a:schemeClr val="accent1"/>
-                </a:fillRef>
-                <a:effectRef idx="0">
-                  <a:schemeClr val="accent1"/>
-                </a:effectRef>
-                <a:fontRef idx="minor">
-                  <a:schemeClr val="tx1"/>
-                </a:fontRef>
-              </p:style>
-            </p:cxnSp>
-            <p:cxnSp>
-              <p:nvCxnSpPr>
-                <p:cNvPr id="196" name="Straight Connector 195"/>
-                <p:cNvCxnSpPr/>
-                <p:nvPr/>
-              </p:nvCxnSpPr>
-              <p:spPr>
-                <a:xfrm flipV="1">
-                  <a:off x="6412348" y="4377142"/>
-                  <a:ext cx="215346" cy="629476"/>
-                </a:xfrm>
-                <a:prstGeom prst="line">
-                  <a:avLst/>
-                </a:prstGeom>
-                <a:ln>
-                  <a:solidFill>
-                    <a:schemeClr val="tx1"/>
-                  </a:solidFill>
-                  <a:headEnd type="oval"/>
-                  <a:tailEnd type="none"/>
-                </a:ln>
-              </p:spPr>
-              <p:style>
-                <a:lnRef idx="1">
-                  <a:schemeClr val="accent1"/>
-                </a:lnRef>
-                <a:fillRef idx="0">
-                  <a:schemeClr val="accent1"/>
-                </a:fillRef>
-                <a:effectRef idx="0">
-                  <a:schemeClr val="accent1"/>
-                </a:effectRef>
-                <a:fontRef idx="minor">
-                  <a:schemeClr val="tx1"/>
-                </a:fontRef>
-              </p:style>
-            </p:cxnSp>
-            <p:cxnSp>
-              <p:nvCxnSpPr>
-                <p:cNvPr id="197" name="Straight Connector 196"/>
-                <p:cNvCxnSpPr/>
-                <p:nvPr/>
-              </p:nvCxnSpPr>
-              <p:spPr>
-                <a:xfrm>
-                  <a:off x="6627694" y="4377141"/>
-                  <a:ext cx="192157" cy="629477"/>
-                </a:xfrm>
-                <a:prstGeom prst="line">
-                  <a:avLst/>
-                </a:prstGeom>
-                <a:ln>
-                  <a:solidFill>
-                    <a:schemeClr val="tx1"/>
-                  </a:solidFill>
-                  <a:headEnd type="none"/>
-                  <a:tailEnd type="oval"/>
-                </a:ln>
-              </p:spPr>
-              <p:style>
-                <a:lnRef idx="1">
-                  <a:schemeClr val="accent1"/>
-                </a:lnRef>
-                <a:fillRef idx="0">
-                  <a:schemeClr val="accent1"/>
-                </a:fillRef>
-                <a:effectRef idx="0">
-                  <a:schemeClr val="accent1"/>
-                </a:effectRef>
-                <a:fontRef idx="minor">
-                  <a:schemeClr val="tx1"/>
-                </a:fontRef>
-              </p:style>
-            </p:cxnSp>
-            <p:cxnSp>
-              <p:nvCxnSpPr>
-                <p:cNvPr id="198" name="Straight Connector 197"/>
-                <p:cNvCxnSpPr/>
-                <p:nvPr/>
-              </p:nvCxnSpPr>
-              <p:spPr>
-                <a:xfrm flipV="1">
-                  <a:off x="5980512" y="5669240"/>
-                  <a:ext cx="215346" cy="629476"/>
-                </a:xfrm>
-                <a:prstGeom prst="line">
-                  <a:avLst/>
-                </a:prstGeom>
-                <a:ln>
-                  <a:solidFill>
-                    <a:schemeClr val="tx1"/>
-                  </a:solidFill>
-                  <a:headEnd type="oval"/>
-                  <a:tailEnd type="none"/>
-                </a:ln>
-              </p:spPr>
-              <p:style>
-                <a:lnRef idx="1">
-                  <a:schemeClr val="accent1"/>
-                </a:lnRef>
-                <a:fillRef idx="0">
-                  <a:schemeClr val="accent1"/>
-                </a:fillRef>
-                <a:effectRef idx="0">
-                  <a:schemeClr val="accent1"/>
-                </a:effectRef>
-                <a:fontRef idx="minor">
-                  <a:schemeClr val="tx1"/>
-                </a:fontRef>
-              </p:style>
-            </p:cxnSp>
-            <p:cxnSp>
-              <p:nvCxnSpPr>
-                <p:cNvPr id="199" name="Straight Connector 198"/>
-                <p:cNvCxnSpPr/>
-                <p:nvPr/>
-              </p:nvCxnSpPr>
-              <p:spPr>
-                <a:xfrm>
-                  <a:off x="6195858" y="5669239"/>
-                  <a:ext cx="192157" cy="629477"/>
-                </a:xfrm>
-                <a:prstGeom prst="line">
-                  <a:avLst/>
-                </a:prstGeom>
-                <a:ln>
-                  <a:solidFill>
-                    <a:schemeClr val="tx1"/>
-                  </a:solidFill>
-                  <a:headEnd type="none"/>
-                  <a:tailEnd type="oval"/>
-                </a:ln>
-              </p:spPr>
-              <p:style>
-                <a:lnRef idx="1">
-                  <a:schemeClr val="accent1"/>
-                </a:lnRef>
-                <a:fillRef idx="0">
-                  <a:schemeClr val="accent1"/>
-                </a:fillRef>
-                <a:effectRef idx="0">
-                  <a:schemeClr val="accent1"/>
-                </a:effectRef>
-                <a:fontRef idx="minor">
-                  <a:schemeClr val="tx1"/>
-                </a:fontRef>
-              </p:style>
-            </p:cxnSp>
-            <p:grpSp>
-              <p:nvGrpSpPr>
-                <p:cNvPr id="200" name="Group 199"/>
-                <p:cNvGrpSpPr/>
-                <p:nvPr/>
-              </p:nvGrpSpPr>
-              <p:grpSpPr>
-                <a:xfrm>
-                  <a:off x="6625399" y="3005561"/>
-                  <a:ext cx="2695578" cy="1353154"/>
-                  <a:chOff x="6625402" y="3005561"/>
-                  <a:chExt cx="2161623" cy="1353154"/>
-                </a:xfrm>
-              </p:grpSpPr>
-              <p:cxnSp>
-                <p:nvCxnSpPr>
-                  <p:cNvPr id="205" name="Straight Connector 204"/>
-                  <p:cNvCxnSpPr/>
-                  <p:nvPr/>
-                </p:nvCxnSpPr>
-                <p:spPr>
-                  <a:xfrm flipV="1">
-                    <a:off x="6625402" y="3729238"/>
-                    <a:ext cx="384313" cy="629477"/>
-                  </a:xfrm>
-                  <a:prstGeom prst="line">
-                    <a:avLst/>
-                  </a:prstGeom>
-                  <a:ln>
-                    <a:solidFill>
-                      <a:schemeClr val="tx1"/>
-                    </a:solidFill>
-                    <a:headEnd type="oval"/>
-                    <a:tailEnd type="none"/>
-                  </a:ln>
-                </p:spPr>
-                <p:style>
-                  <a:lnRef idx="1">
-                    <a:schemeClr val="accent1"/>
-                  </a:lnRef>
-                  <a:fillRef idx="0">
-                    <a:schemeClr val="accent1"/>
-                  </a:fillRef>
-                  <a:effectRef idx="0">
-                    <a:schemeClr val="accent1"/>
-                  </a:effectRef>
-                  <a:fontRef idx="minor">
-                    <a:schemeClr val="tx1"/>
-                  </a:fontRef>
-                </p:style>
-              </p:cxnSp>
-              <p:cxnSp>
-                <p:nvCxnSpPr>
-                  <p:cNvPr id="206" name="Straight Connector 205"/>
-                  <p:cNvCxnSpPr/>
-                  <p:nvPr/>
-                </p:nvCxnSpPr>
-                <p:spPr>
-                  <a:xfrm>
-                    <a:off x="7009714" y="3729238"/>
-                    <a:ext cx="384313" cy="629477"/>
-                  </a:xfrm>
-                  <a:prstGeom prst="line">
-                    <a:avLst/>
-                  </a:prstGeom>
-                  <a:ln>
-                    <a:solidFill>
-                      <a:schemeClr val="tx1"/>
-                    </a:solidFill>
-                    <a:headEnd type="none"/>
-                    <a:tailEnd type="oval"/>
-                  </a:ln>
-                </p:spPr>
-                <p:style>
-                  <a:lnRef idx="1">
-                    <a:schemeClr val="accent1"/>
-                  </a:lnRef>
-                  <a:fillRef idx="0">
-                    <a:schemeClr val="accent1"/>
-                  </a:fillRef>
-                  <a:effectRef idx="0">
-                    <a:schemeClr val="accent1"/>
-                  </a:effectRef>
-                  <a:fontRef idx="minor">
-                    <a:schemeClr val="tx1"/>
-                  </a:fontRef>
-                </p:style>
-              </p:cxnSp>
-              <p:cxnSp>
-                <p:nvCxnSpPr>
-                  <p:cNvPr id="207" name="Straight Connector 206"/>
-                  <p:cNvCxnSpPr/>
-                  <p:nvPr/>
-                </p:nvCxnSpPr>
-                <p:spPr>
-                  <a:xfrm flipV="1">
-                    <a:off x="7012731" y="3005561"/>
-                    <a:ext cx="683902" cy="723364"/>
-                  </a:xfrm>
-                  <a:prstGeom prst="line">
-                    <a:avLst/>
-                  </a:prstGeom>
-                  <a:ln>
-                    <a:solidFill>
-                      <a:schemeClr val="tx1"/>
-                    </a:solidFill>
-                    <a:headEnd type="oval"/>
-                    <a:tailEnd type="oval"/>
-                  </a:ln>
-                </p:spPr>
-                <p:style>
-                  <a:lnRef idx="1">
-                    <a:schemeClr val="accent1"/>
-                  </a:lnRef>
-                  <a:fillRef idx="0">
-                    <a:schemeClr val="accent1"/>
-                  </a:fillRef>
-                  <a:effectRef idx="0">
-                    <a:schemeClr val="accent1"/>
-                  </a:effectRef>
-                  <a:fontRef idx="minor">
-                    <a:schemeClr val="tx1"/>
-                  </a:fontRef>
-                </p:style>
-              </p:cxnSp>
-              <p:cxnSp>
-                <p:nvCxnSpPr>
-                  <p:cNvPr id="208" name="Straight Connector 207"/>
-                  <p:cNvCxnSpPr/>
-                  <p:nvPr/>
-                </p:nvCxnSpPr>
-                <p:spPr>
-                  <a:xfrm flipH="1" flipV="1">
-                    <a:off x="7702217" y="3005562"/>
-                    <a:ext cx="700496" cy="714975"/>
-                  </a:xfrm>
-                  <a:prstGeom prst="line">
-                    <a:avLst/>
-                  </a:prstGeom>
-                  <a:ln>
-                    <a:solidFill>
-                      <a:schemeClr val="tx1"/>
-                    </a:solidFill>
-                    <a:headEnd type="oval"/>
-                    <a:tailEnd type="none"/>
-                  </a:ln>
-                </p:spPr>
-                <p:style>
-                  <a:lnRef idx="1">
-                    <a:schemeClr val="accent1"/>
-                  </a:lnRef>
-                  <a:fillRef idx="0">
-                    <a:schemeClr val="accent1"/>
-                  </a:fillRef>
-                  <a:effectRef idx="0">
-                    <a:schemeClr val="accent1"/>
-                  </a:effectRef>
-                  <a:fontRef idx="minor">
-                    <a:schemeClr val="tx1"/>
-                  </a:fontRef>
-                </p:style>
-              </p:cxnSp>
-              <p:cxnSp>
-                <p:nvCxnSpPr>
-                  <p:cNvPr id="209" name="Straight Connector 208"/>
-                  <p:cNvCxnSpPr/>
-                  <p:nvPr/>
-                </p:nvCxnSpPr>
-                <p:spPr>
-                  <a:xfrm flipV="1">
-                    <a:off x="8018400" y="3716872"/>
-                    <a:ext cx="384313" cy="629477"/>
-                  </a:xfrm>
-                  <a:prstGeom prst="line">
-                    <a:avLst/>
-                  </a:prstGeom>
-                  <a:ln>
-                    <a:solidFill>
-                      <a:schemeClr val="tx1"/>
-                    </a:solidFill>
-                    <a:headEnd type="oval"/>
-                    <a:tailEnd type="none"/>
-                  </a:ln>
-                </p:spPr>
-                <p:style>
-                  <a:lnRef idx="1">
-                    <a:schemeClr val="accent1"/>
-                  </a:lnRef>
-                  <a:fillRef idx="0">
-                    <a:schemeClr val="accent1"/>
-                  </a:fillRef>
-                  <a:effectRef idx="0">
-                    <a:schemeClr val="accent1"/>
-                  </a:effectRef>
-                  <a:fontRef idx="minor">
-                    <a:schemeClr val="tx1"/>
-                  </a:fontRef>
-                </p:style>
-              </p:cxnSp>
-              <p:cxnSp>
-                <p:nvCxnSpPr>
-                  <p:cNvPr id="210" name="Straight Connector 209"/>
-                  <p:cNvCxnSpPr/>
-                  <p:nvPr/>
-                </p:nvCxnSpPr>
-                <p:spPr>
-                  <a:xfrm>
-                    <a:off x="8402712" y="3716872"/>
-                    <a:ext cx="384313" cy="629477"/>
-                  </a:xfrm>
-                  <a:prstGeom prst="line">
-                    <a:avLst/>
-                  </a:prstGeom>
-                  <a:ln>
-                    <a:solidFill>
-                      <a:schemeClr val="tx1"/>
-                    </a:solidFill>
-                    <a:headEnd type="none"/>
-                    <a:tailEnd type="oval"/>
-                  </a:ln>
-                </p:spPr>
-                <p:style>
-                  <a:lnRef idx="1">
-                    <a:schemeClr val="accent1"/>
-                  </a:lnRef>
-                  <a:fillRef idx="0">
-                    <a:schemeClr val="accent1"/>
-                  </a:fillRef>
-                  <a:effectRef idx="0">
-                    <a:schemeClr val="accent1"/>
-                  </a:effectRef>
-                  <a:fontRef idx="minor">
-                    <a:schemeClr val="tx1"/>
-                  </a:fontRef>
-                </p:style>
-              </p:cxnSp>
-            </p:grpSp>
-            <p:cxnSp>
-              <p:nvCxnSpPr>
-                <p:cNvPr id="201" name="Straight Connector 200"/>
-                <p:cNvCxnSpPr/>
-                <p:nvPr/>
-              </p:nvCxnSpPr>
-              <p:spPr>
-                <a:xfrm flipV="1">
-                  <a:off x="8936665" y="4376041"/>
-                  <a:ext cx="384313" cy="629477"/>
-                </a:xfrm>
-                <a:prstGeom prst="line">
-                  <a:avLst/>
-                </a:prstGeom>
-                <a:ln>
-                  <a:solidFill>
-                    <a:schemeClr val="tx1"/>
-                  </a:solidFill>
-                  <a:headEnd type="oval"/>
-                  <a:tailEnd type="none"/>
-                </a:ln>
-              </p:spPr>
-              <p:style>
-                <a:lnRef idx="1">
-                  <a:schemeClr val="accent1"/>
-                </a:lnRef>
-                <a:fillRef idx="0">
-                  <a:schemeClr val="accent1"/>
-                </a:fillRef>
-                <a:effectRef idx="0">
-                  <a:schemeClr val="accent1"/>
-                </a:effectRef>
-                <a:fontRef idx="minor">
-                  <a:schemeClr val="tx1"/>
-                </a:fontRef>
-              </p:style>
-            </p:cxnSp>
-            <p:cxnSp>
-              <p:nvCxnSpPr>
-                <p:cNvPr id="202" name="Straight Connector 201"/>
-                <p:cNvCxnSpPr/>
-                <p:nvPr/>
-              </p:nvCxnSpPr>
-              <p:spPr>
-                <a:xfrm>
-                  <a:off x="9320977" y="4376041"/>
-                  <a:ext cx="384313" cy="629477"/>
-                </a:xfrm>
-                <a:prstGeom prst="line">
-                  <a:avLst/>
-                </a:prstGeom>
-                <a:ln>
-                  <a:solidFill>
-                    <a:schemeClr val="tx1"/>
-                  </a:solidFill>
-                  <a:headEnd type="none"/>
-                  <a:tailEnd type="oval"/>
-                </a:ln>
-              </p:spPr>
-              <p:style>
-                <a:lnRef idx="1">
-                  <a:schemeClr val="accent1"/>
-                </a:lnRef>
-                <a:fillRef idx="0">
-                  <a:schemeClr val="accent1"/>
-                </a:fillRef>
-                <a:effectRef idx="0">
-                  <a:schemeClr val="accent1"/>
-                </a:effectRef>
-                <a:fontRef idx="minor">
-                  <a:schemeClr val="tx1"/>
-                </a:fontRef>
-              </p:style>
-            </p:cxnSp>
-            <p:cxnSp>
-              <p:nvCxnSpPr>
-                <p:cNvPr id="203" name="Straight Connector 202"/>
-                <p:cNvCxnSpPr/>
-                <p:nvPr/>
-              </p:nvCxnSpPr>
-              <p:spPr>
-                <a:xfrm flipV="1">
-                  <a:off x="8718005" y="5005519"/>
-                  <a:ext cx="215346" cy="629476"/>
-                </a:xfrm>
-                <a:prstGeom prst="line">
-                  <a:avLst/>
-                </a:prstGeom>
-                <a:ln>
-                  <a:solidFill>
-                    <a:schemeClr val="tx1"/>
-                  </a:solidFill>
-                  <a:headEnd type="oval"/>
-                  <a:tailEnd type="none"/>
-                </a:ln>
-              </p:spPr>
-              <p:style>
-                <a:lnRef idx="1">
-                  <a:schemeClr val="accent1"/>
-                </a:lnRef>
-                <a:fillRef idx="0">
-                  <a:schemeClr val="accent1"/>
-                </a:fillRef>
-                <a:effectRef idx="0">
-                  <a:schemeClr val="accent1"/>
-                </a:effectRef>
-                <a:fontRef idx="minor">
-                  <a:schemeClr val="tx1"/>
-                </a:fontRef>
-              </p:style>
-            </p:cxnSp>
-            <p:cxnSp>
-              <p:nvCxnSpPr>
-                <p:cNvPr id="204" name="Straight Connector 203"/>
-                <p:cNvCxnSpPr/>
-                <p:nvPr/>
-              </p:nvCxnSpPr>
-              <p:spPr>
-                <a:xfrm>
-                  <a:off x="8933351" y="5005518"/>
-                  <a:ext cx="192157" cy="629477"/>
-                </a:xfrm>
-                <a:prstGeom prst="line">
-                  <a:avLst/>
-                </a:prstGeom>
-                <a:ln>
-                  <a:solidFill>
-                    <a:schemeClr val="tx1"/>
-                  </a:solidFill>
-                  <a:headEnd type="none"/>
-                  <a:tailEnd type="oval"/>
-                </a:ln>
-              </p:spPr>
-              <p:style>
-                <a:lnRef idx="1">
-                  <a:schemeClr val="accent1"/>
-                </a:lnRef>
-                <a:fillRef idx="0">
-                  <a:schemeClr val="accent1"/>
-                </a:fillRef>
-                <a:effectRef idx="0">
-                  <a:schemeClr val="accent1"/>
-                </a:effectRef>
-                <a:fontRef idx="minor">
-                  <a:schemeClr val="tx1"/>
-                </a:fontRef>
-              </p:style>
-            </p:cxnSp>
-          </p:grpSp>
-          <p:sp>
-            <p:nvSpPr>
-              <p:cNvPr id="176" name="TextBox 175"/>
-              <p:cNvSpPr txBox="1"/>
-              <p:nvPr/>
-            </p:nvSpPr>
-            <p:spPr>
-              <a:xfrm>
-                <a:off x="5819262" y="6313435"/>
-                <a:ext cx="290464" cy="338554"/>
-              </a:xfrm>
-              <a:prstGeom prst="rect">
-                <a:avLst/>
-              </a:prstGeom>
-              <a:noFill/>
-            </p:spPr>
-            <p:txBody>
-              <a:bodyPr wrap="none" rtlCol="0">
-                <a:spAutoFit/>
-              </a:bodyPr>
-              <a:lstStyle/>
-              <a:p>
-                <a:r>
-                  <a:rPr lang="en-US" sz="1600" dirty="0">
-                    <a:latin typeface="Apple Chancery" charset="0"/>
-                    <a:ea typeface="Apple Chancery" charset="0"/>
-                    <a:cs typeface="Apple Chancery" charset="0"/>
-                  </a:rPr>
-                  <a:t>a</a:t>
-                </a:r>
-              </a:p>
-            </p:txBody>
-          </p:sp>
-          <p:sp>
-            <p:nvSpPr>
-              <p:cNvPr id="177" name="TextBox 176"/>
-              <p:cNvSpPr txBox="1"/>
-              <p:nvPr/>
-            </p:nvSpPr>
-            <p:spPr>
-              <a:xfrm>
-                <a:off x="6245989" y="6384755"/>
-                <a:ext cx="284052" cy="338554"/>
-              </a:xfrm>
-              <a:prstGeom prst="rect">
-                <a:avLst/>
-              </a:prstGeom>
-              <a:noFill/>
-            </p:spPr>
-            <p:txBody>
-              <a:bodyPr wrap="none" rtlCol="0">
-                <a:spAutoFit/>
-              </a:bodyPr>
-              <a:lstStyle/>
-              <a:p>
-                <a:r>
-                  <a:rPr lang="en-US" sz="1600" dirty="0">
-                    <a:latin typeface="Apple Chancery" charset="0"/>
-                    <a:ea typeface="Apple Chancery" charset="0"/>
-                    <a:cs typeface="Apple Chancery" charset="0"/>
-                  </a:rPr>
-                  <a:t>b</a:t>
-                </a:r>
-              </a:p>
-            </p:txBody>
-          </p:sp>
-          <p:sp>
-            <p:nvSpPr>
-              <p:cNvPr id="178" name="TextBox 177"/>
-              <p:cNvSpPr txBox="1"/>
-              <p:nvPr/>
-            </p:nvSpPr>
-            <p:spPr>
-              <a:xfrm>
-                <a:off x="6479725" y="5663222"/>
-                <a:ext cx="263214" cy="338554"/>
-              </a:xfrm>
-              <a:prstGeom prst="rect">
-                <a:avLst/>
-              </a:prstGeom>
-              <a:noFill/>
-            </p:spPr>
-            <p:txBody>
-              <a:bodyPr wrap="none" rtlCol="0">
-                <a:spAutoFit/>
-              </a:bodyPr>
-              <a:lstStyle/>
-              <a:p>
-                <a:r>
-                  <a:rPr lang="en-US" sz="1600" dirty="0">
-                    <a:latin typeface="Apple Chancery" charset="0"/>
-                    <a:ea typeface="Apple Chancery" charset="0"/>
-                    <a:cs typeface="Apple Chancery" charset="0"/>
-                  </a:rPr>
-                  <a:t>c</a:t>
-                </a:r>
-              </a:p>
-            </p:txBody>
-          </p:sp>
-          <p:sp>
-            <p:nvSpPr>
-              <p:cNvPr id="179" name="TextBox 178"/>
-              <p:cNvSpPr txBox="1"/>
-              <p:nvPr/>
-            </p:nvSpPr>
-            <p:spPr>
-              <a:xfrm>
-                <a:off x="6625402" y="5046656"/>
-                <a:ext cx="290464" cy="338554"/>
-              </a:xfrm>
-              <a:prstGeom prst="rect">
-                <a:avLst/>
-              </a:prstGeom>
-              <a:noFill/>
-            </p:spPr>
-            <p:txBody>
-              <a:bodyPr wrap="none" rtlCol="0">
-                <a:spAutoFit/>
-              </a:bodyPr>
-              <a:lstStyle/>
-              <a:p>
-                <a:r>
-                  <a:rPr lang="en-US" sz="1600" dirty="0">
-                    <a:latin typeface="Apple Chancery" charset="0"/>
-                    <a:ea typeface="Apple Chancery" charset="0"/>
-                    <a:cs typeface="Apple Chancery" charset="0"/>
-                  </a:rPr>
-                  <a:t>d</a:t>
-                </a:r>
-              </a:p>
-            </p:txBody>
-          </p:sp>
-          <p:sp>
-            <p:nvSpPr>
-              <p:cNvPr id="180" name="TextBox 179"/>
-              <p:cNvSpPr txBox="1"/>
-              <p:nvPr/>
-            </p:nvSpPr>
-            <p:spPr>
-              <a:xfrm>
-                <a:off x="6846796" y="5645423"/>
-                <a:ext cx="261610" cy="338554"/>
-              </a:xfrm>
-              <a:prstGeom prst="rect">
-                <a:avLst/>
-              </a:prstGeom>
-              <a:noFill/>
-            </p:spPr>
-            <p:txBody>
-              <a:bodyPr wrap="none" rtlCol="0">
-                <a:spAutoFit/>
-              </a:bodyPr>
-              <a:lstStyle/>
-              <a:p>
-                <a:r>
-                  <a:rPr lang="en-US" sz="1600" dirty="0">
-                    <a:latin typeface="Apple Chancery" charset="0"/>
-                    <a:ea typeface="Apple Chancery" charset="0"/>
-                    <a:cs typeface="Apple Chancery" charset="0"/>
-                  </a:rPr>
-                  <a:t>e</a:t>
-                </a:r>
-              </a:p>
-            </p:txBody>
-          </p:sp>
-          <p:sp>
-            <p:nvSpPr>
-              <p:cNvPr id="181" name="TextBox 180"/>
-              <p:cNvSpPr txBox="1"/>
-              <p:nvPr/>
-            </p:nvSpPr>
-            <p:spPr>
-              <a:xfrm>
-                <a:off x="7240700" y="5730295"/>
-                <a:ext cx="248786" cy="338554"/>
-              </a:xfrm>
-              <a:prstGeom prst="rect">
-                <a:avLst/>
-              </a:prstGeom>
-              <a:noFill/>
-            </p:spPr>
-            <p:txBody>
-              <a:bodyPr wrap="none" rtlCol="0">
-                <a:spAutoFit/>
-              </a:bodyPr>
-              <a:lstStyle/>
-              <a:p>
-                <a:r>
-                  <a:rPr lang="en-US" sz="1600" dirty="0">
-                    <a:latin typeface="Apple Chancery" charset="0"/>
-                    <a:ea typeface="Apple Chancery" charset="0"/>
-                    <a:cs typeface="Apple Chancery" charset="0"/>
-                  </a:rPr>
-                  <a:t>f</a:t>
-                </a:r>
-              </a:p>
-            </p:txBody>
-          </p:sp>
-          <p:sp>
-            <p:nvSpPr>
-              <p:cNvPr id="182" name="TextBox 181"/>
-              <p:cNvSpPr txBox="1"/>
-              <p:nvPr/>
-            </p:nvSpPr>
-            <p:spPr>
-              <a:xfrm>
-                <a:off x="7606167" y="5663222"/>
-                <a:ext cx="280846" cy="338554"/>
-              </a:xfrm>
-              <a:prstGeom prst="rect">
-                <a:avLst/>
-              </a:prstGeom>
-              <a:noFill/>
-            </p:spPr>
-            <p:txBody>
-              <a:bodyPr wrap="none" rtlCol="0">
-                <a:spAutoFit/>
-              </a:bodyPr>
-              <a:lstStyle/>
-              <a:p>
-                <a:r>
-                  <a:rPr lang="en-US" sz="1600" dirty="0">
-                    <a:latin typeface="Apple Chancery" charset="0"/>
-                    <a:ea typeface="Apple Chancery" charset="0"/>
-                    <a:cs typeface="Apple Chancery" charset="0"/>
-                  </a:rPr>
-                  <a:t>g</a:t>
-                </a:r>
-              </a:p>
-            </p:txBody>
-          </p:sp>
-          <p:sp>
-            <p:nvSpPr>
-              <p:cNvPr id="183" name="TextBox 182"/>
-              <p:cNvSpPr txBox="1"/>
-              <p:nvPr/>
-            </p:nvSpPr>
-            <p:spPr>
-              <a:xfrm>
-                <a:off x="8003694" y="5740014"/>
-                <a:ext cx="293670" cy="338554"/>
-              </a:xfrm>
-              <a:prstGeom prst="rect">
-                <a:avLst/>
-              </a:prstGeom>
-              <a:noFill/>
-            </p:spPr>
-            <p:txBody>
-              <a:bodyPr wrap="none" rtlCol="0">
-                <a:spAutoFit/>
-              </a:bodyPr>
-              <a:lstStyle/>
-              <a:p>
-                <a:r>
-                  <a:rPr lang="en-US" sz="1600" dirty="0">
-                    <a:latin typeface="Apple Chancery" charset="0"/>
-                    <a:ea typeface="Apple Chancery" charset="0"/>
-                    <a:cs typeface="Apple Chancery" charset="0"/>
-                  </a:rPr>
-                  <a:t>h</a:t>
-                </a:r>
-              </a:p>
-            </p:txBody>
-          </p:sp>
-          <p:sp>
-            <p:nvSpPr>
-              <p:cNvPr id="184" name="TextBox 183"/>
-              <p:cNvSpPr txBox="1"/>
-              <p:nvPr/>
-            </p:nvSpPr>
-            <p:spPr>
-              <a:xfrm>
-                <a:off x="8211192" y="4376041"/>
-                <a:ext cx="245580" cy="338554"/>
-              </a:xfrm>
-              <a:prstGeom prst="rect">
-                <a:avLst/>
-              </a:prstGeom>
-              <a:noFill/>
-            </p:spPr>
-            <p:txBody>
-              <a:bodyPr wrap="none" rtlCol="0">
-                <a:spAutoFit/>
-              </a:bodyPr>
-              <a:lstStyle/>
-              <a:p>
-                <a:r>
-                  <a:rPr lang="en-US" sz="1600" dirty="0">
-                    <a:latin typeface="Apple Chancery" charset="0"/>
-                    <a:ea typeface="Apple Chancery" charset="0"/>
-                    <a:cs typeface="Apple Chancery" charset="0"/>
-                  </a:rPr>
-                  <a:t>i</a:t>
-                </a:r>
-              </a:p>
-            </p:txBody>
-          </p:sp>
-          <p:sp>
-            <p:nvSpPr>
-              <p:cNvPr id="185" name="TextBox 184"/>
-              <p:cNvSpPr txBox="1"/>
-              <p:nvPr/>
-            </p:nvSpPr>
-            <p:spPr>
-              <a:xfrm>
-                <a:off x="9582500" y="5082587"/>
-                <a:ext cx="239168" cy="338554"/>
-              </a:xfrm>
-              <a:prstGeom prst="rect">
-                <a:avLst/>
-              </a:prstGeom>
-              <a:noFill/>
-            </p:spPr>
-            <p:txBody>
-              <a:bodyPr wrap="none" rtlCol="0">
-                <a:spAutoFit/>
-              </a:bodyPr>
-              <a:lstStyle/>
-              <a:p>
-                <a:r>
-                  <a:rPr lang="en-US" sz="1600" dirty="0">
-                    <a:latin typeface="Apple Chancery" charset="0"/>
-                    <a:ea typeface="Apple Chancery" charset="0"/>
-                    <a:cs typeface="Apple Chancery" charset="0"/>
-                  </a:rPr>
-                  <a:t>l</a:t>
-                </a:r>
-              </a:p>
-            </p:txBody>
-          </p:sp>
-          <p:sp>
-            <p:nvSpPr>
-              <p:cNvPr id="186" name="TextBox 185"/>
-              <p:cNvSpPr txBox="1"/>
-              <p:nvPr/>
-            </p:nvSpPr>
-            <p:spPr>
-              <a:xfrm>
-                <a:off x="8999510" y="5716993"/>
-                <a:ext cx="279244" cy="338554"/>
-              </a:xfrm>
-              <a:prstGeom prst="rect">
-                <a:avLst/>
-              </a:prstGeom>
-              <a:noFill/>
-            </p:spPr>
-            <p:txBody>
-              <a:bodyPr wrap="none" rtlCol="0">
-                <a:spAutoFit/>
-              </a:bodyPr>
-              <a:lstStyle/>
-              <a:p>
-                <a:r>
-                  <a:rPr lang="en-US" sz="1600" dirty="0">
-                    <a:latin typeface="Apple Chancery" charset="0"/>
-                    <a:ea typeface="Apple Chancery" charset="0"/>
-                    <a:cs typeface="Apple Chancery" charset="0"/>
-                  </a:rPr>
-                  <a:t>k</a:t>
-                </a:r>
-              </a:p>
-            </p:txBody>
-          </p:sp>
-          <p:sp>
-            <p:nvSpPr>
-              <p:cNvPr id="187" name="TextBox 186"/>
-              <p:cNvSpPr txBox="1"/>
-              <p:nvPr/>
-            </p:nvSpPr>
-            <p:spPr>
-              <a:xfrm>
-                <a:off x="8589159" y="5663222"/>
-                <a:ext cx="239168" cy="338554"/>
-              </a:xfrm>
-              <a:prstGeom prst="rect">
-                <a:avLst/>
-              </a:prstGeom>
-              <a:noFill/>
-            </p:spPr>
-            <p:txBody>
-              <a:bodyPr wrap="none" rtlCol="0">
-                <a:spAutoFit/>
-              </a:bodyPr>
-              <a:lstStyle/>
-              <a:p>
-                <a:r>
-                  <a:rPr lang="en-US" sz="1600" dirty="0">
-                    <a:latin typeface="Apple Chancery" charset="0"/>
-                    <a:ea typeface="Apple Chancery" charset="0"/>
-                    <a:cs typeface="Apple Chancery" charset="0"/>
-                  </a:rPr>
-                  <a:t>j</a:t>
-                </a:r>
-              </a:p>
-            </p:txBody>
-          </p:sp>
-        </p:grpSp>
-        <p:sp>
-          <p:nvSpPr>
-            <p:cNvPr id="172" name="Oval 171"/>
-            <p:cNvSpPr/>
-            <p:nvPr/>
-          </p:nvSpPr>
-          <p:spPr>
-            <a:xfrm>
-              <a:off x="4996114" y="2814820"/>
-              <a:ext cx="144394" cy="144394"/>
-            </a:xfrm>
-            <a:prstGeom prst="ellipse">
-              <a:avLst/>
-            </a:prstGeom>
-            <a:noFill/>
-            <a:ln>
-              <a:solidFill>
-                <a:schemeClr val="tx1"/>
-              </a:solidFill>
-            </a:ln>
-            <a:effectLst/>
-          </p:spPr>
-          <p:style>
-            <a:lnRef idx="2">
-              <a:schemeClr val="accent1">
-                <a:shade val="50000"/>
-              </a:schemeClr>
-            </a:lnRef>
-            <a:fillRef idx="1">
-              <a:schemeClr val="accent1"/>
-            </a:fillRef>
-            <a:effectRef idx="0">
-              <a:schemeClr val="accent1"/>
-            </a:effectRef>
-            <a:fontRef idx="minor">
-              <a:schemeClr val="lt1"/>
-            </a:fontRef>
-          </p:style>
-          <p:txBody>
-            <a:bodyPr rtlCol="0" anchor="ctr"/>
-            <a:lstStyle/>
-            <a:p>
-              <a:pPr algn="ctr"/>
-              <a:endParaRPr lang="en-US"/>
-            </a:p>
-          </p:txBody>
-        </p:sp>
-        <p:sp>
-          <p:nvSpPr>
-            <p:cNvPr id="174" name="Oval 173"/>
-            <p:cNvSpPr/>
-            <p:nvPr/>
-          </p:nvSpPr>
-          <p:spPr>
-            <a:xfrm>
-              <a:off x="6537324" y="2822221"/>
-              <a:ext cx="144394" cy="144394"/>
-            </a:xfrm>
-            <a:prstGeom prst="ellipse">
-              <a:avLst/>
-            </a:prstGeom>
-            <a:noFill/>
-            <a:ln>
-              <a:solidFill>
-                <a:schemeClr val="tx1"/>
-              </a:solidFill>
-            </a:ln>
-            <a:effectLst/>
-          </p:spPr>
-          <p:style>
-            <a:lnRef idx="2">
-              <a:schemeClr val="accent1">
-                <a:shade val="50000"/>
-              </a:schemeClr>
-            </a:lnRef>
-            <a:fillRef idx="1">
-              <a:schemeClr val="accent1"/>
-            </a:fillRef>
-            <a:effectRef idx="0">
-              <a:schemeClr val="accent1"/>
-            </a:effectRef>
-            <a:fontRef idx="minor">
-              <a:schemeClr val="lt1"/>
-            </a:fontRef>
-          </p:style>
-          <p:txBody>
-            <a:bodyPr rtlCol="0" anchor="ctr"/>
-            <a:lstStyle/>
-            <a:p>
-              <a:pPr algn="ctr"/>
-              <a:endParaRPr lang="en-US"/>
-            </a:p>
-          </p:txBody>
-        </p:sp>
-      </p:grpSp>
-      <p:sp>
-        <p:nvSpPr>
-          <p:cNvPr id="211" name="Rectangle 210"/>
-          <p:cNvSpPr/>
-          <p:nvPr/>
-        </p:nvSpPr>
-        <p:spPr>
-          <a:xfrm>
-            <a:off x="5964823" y="3041476"/>
-            <a:ext cx="145774" cy="145774"/>
-          </a:xfrm>
-          <a:prstGeom prst="rect">
-            <a:avLst/>
-          </a:prstGeom>
-          <a:noFill/>
-          <a:ln>
-            <a:solidFill>
-              <a:schemeClr val="tx1"/>
-            </a:solidFill>
-          </a:ln>
-        </p:spPr>
-        <p:style>
-          <a:lnRef idx="2">
-            <a:schemeClr val="accent1">
-              <a:shade val="50000"/>
-            </a:schemeClr>
-          </a:lnRef>
-          <a:fillRef idx="1">
-            <a:schemeClr val="accent1"/>
-          </a:fillRef>
-          <a:effectRef idx="0">
-            <a:schemeClr val="accent1"/>
-          </a:effectRef>
-          <a:fontRef idx="minor">
-            <a:schemeClr val="lt1"/>
-          </a:fontRef>
-        </p:style>
-        <p:txBody>
-          <a:bodyPr rtlCol="0" anchor="ctr"/>
-          <a:lstStyle/>
-          <a:p>
-            <a:pPr algn="ctr"/>
-            <a:endParaRPr lang="en-US"/>
-          </a:p>
-        </p:txBody>
-      </p:sp>
-      <p:grpSp>
-        <p:nvGrpSpPr>
-          <p:cNvPr id="212" name="Group 211"/>
-          <p:cNvGrpSpPr/>
-          <p:nvPr/>
-        </p:nvGrpSpPr>
-        <p:grpSpPr>
-          <a:xfrm>
-            <a:off x="8824192" y="1099619"/>
+            <a:off x="4842600" y="1099619"/>
             <a:ext cx="4002406" cy="3717748"/>
             <a:chOff x="4467540" y="885213"/>
             <a:chExt cx="4002406" cy="3717748"/>
@@ -11593,13 +10183,13 @@
       </p:sp>
       <p:sp>
         <p:nvSpPr>
-          <p:cNvPr id="254" name="TextBox 253"/>
+          <p:cNvPr id="255" name="TextBox 254"/>
           <p:cNvSpPr txBox="1"/>
           <p:nvPr/>
         </p:nvSpPr>
         <p:spPr>
           <a:xfrm>
-            <a:off x="4626183" y="991941"/>
+            <a:off x="4875116" y="991941"/>
             <a:ext cx="447558" cy="369332"/>
           </a:xfrm>
           <a:prstGeom prst="rect">
@@ -11614,53 +10204,205 @@
           <a:lstStyle/>
           <a:p>
             <a:r>
-              <a:rPr lang="en-US" dirty="0"/>
+              <a:rPr lang="en-US" dirty="0" smtClean="0"/>
               <a:t>(b)</a:t>
             </a:r>
+            <a:endParaRPr lang="en-US" dirty="0"/>
           </a:p>
         </p:txBody>
       </p:sp>
+      <mc:AlternateContent xmlns:mc="http://schemas.openxmlformats.org/markup-compatibility/2006">
+        <mc:Choice xmlns:a14="http://schemas.microsoft.com/office/drawing/2010/main" Requires="a14">
+          <p:sp>
+            <p:nvSpPr>
+              <p:cNvPr id="173" name="TextBox 172"/>
+              <p:cNvSpPr txBox="1"/>
+              <p:nvPr/>
+            </p:nvSpPr>
+            <p:spPr>
+              <a:xfrm>
+                <a:off x="519937" y="3547076"/>
+                <a:ext cx="347788" cy="338554"/>
+              </a:xfrm>
+              <a:prstGeom prst="rect">
+                <a:avLst/>
+              </a:prstGeom>
+              <a:noFill/>
+            </p:spPr>
+            <p:txBody>
+              <a:bodyPr wrap="none" rtlCol="0">
+                <a:spAutoFit/>
+              </a:bodyPr>
+              <a:lstStyle/>
+              <a:p>
+                <a:pPr/>
+                <a14:m>
+                  <m:oMathPara xmlns:m="http://schemas.openxmlformats.org/officeDocument/2006/math">
+                    <m:oMathParaPr>
+                      <m:jc m:val="centerGroup"/>
+                    </m:oMathParaPr>
+                    <m:oMath xmlns:m="http://schemas.openxmlformats.org/officeDocument/2006/math">
+                      <m:r>
+                        <a:rPr lang="en-US" sz="1600" b="0" i="1" smtClean="0">
+                          <a:latin typeface="Cambria Math" charset="0"/>
+                          <a:ea typeface="Cambria Math" charset="0"/>
+                          <a:cs typeface="Cambria Math" charset="0"/>
+                        </a:rPr>
+                        <m:t>𝑣</m:t>
+                      </m:r>
+                    </m:oMath>
+                  </m:oMathPara>
+                </a14:m>
+                <a:endParaRPr lang="en-US" sz="1600" i="1" dirty="0">
+                  <a:latin typeface="Cambria Math" charset="0"/>
+                  <a:ea typeface="Cambria Math" charset="0"/>
+                  <a:cs typeface="Cambria Math" charset="0"/>
+                </a:endParaRPr>
+              </a:p>
+            </p:txBody>
+          </p:sp>
+        </mc:Choice>
+        <mc:Fallback>
+          <p:sp>
+            <p:nvSpPr>
+              <p:cNvPr id="173" name="TextBox 172"/>
+              <p:cNvSpPr txBox="1">
+                <a:spLocks noRot="1" noChangeAspect="1" noMove="1" noResize="1" noEditPoints="1" noAdjustHandles="1" noChangeArrowheads="1" noChangeShapeType="1" noTextEdit="1"/>
+              </p:cNvSpPr>
+              <p:nvPr/>
+            </p:nvSpPr>
+            <p:spPr>
+              <a:xfrm>
+                <a:off x="519937" y="3547076"/>
+                <a:ext cx="347788" cy="338554"/>
+              </a:xfrm>
+              <a:prstGeom prst="rect">
+                <a:avLst/>
+              </a:prstGeom>
+              <a:blipFill rotWithShape="0">
+                <a:blip r:embed="rId3"/>
+                <a:stretch>
+                  <a:fillRect/>
+                </a:stretch>
+              </a:blipFill>
+            </p:spPr>
+            <p:txBody>
+              <a:bodyPr/>
+              <a:lstStyle/>
+              <a:p>
+                <a:r>
+                  <a:rPr lang="en-US">
+                    <a:noFill/>
+                  </a:rPr>
+                  <a:t> </a:t>
+                </a:r>
+              </a:p>
+            </p:txBody>
+          </p:sp>
+        </mc:Fallback>
+      </mc:AlternateContent>
+      <mc:AlternateContent xmlns:mc="http://schemas.openxmlformats.org/markup-compatibility/2006">
+        <mc:Choice xmlns:a14="http://schemas.microsoft.com/office/drawing/2010/main" Requires="a14">
+          <p:sp>
+            <p:nvSpPr>
+              <p:cNvPr id="215" name="TextBox 214"/>
+              <p:cNvSpPr txBox="1"/>
+              <p:nvPr/>
+            </p:nvSpPr>
+            <p:spPr>
+              <a:xfrm>
+                <a:off x="697737" y="2899376"/>
+                <a:ext cx="387862" cy="338554"/>
+              </a:xfrm>
+              <a:prstGeom prst="rect">
+                <a:avLst/>
+              </a:prstGeom>
+              <a:noFill/>
+            </p:spPr>
+            <p:txBody>
+              <a:bodyPr wrap="none" rtlCol="0">
+                <a:spAutoFit/>
+              </a:bodyPr>
+              <a:lstStyle/>
+              <a:p>
+                <a:pPr/>
+                <a14:m>
+                  <m:oMathPara xmlns:m="http://schemas.openxmlformats.org/officeDocument/2006/math">
+                    <m:oMathParaPr>
+                      <m:jc m:val="centerGroup"/>
+                    </m:oMathParaPr>
+                    <m:oMath xmlns:m="http://schemas.openxmlformats.org/officeDocument/2006/math">
+                      <m:r>
+                        <a:rPr lang="en-US" sz="1600" b="0" i="1" smtClean="0">
+                          <a:latin typeface="Cambria Math" charset="0"/>
+                          <a:ea typeface="Cambria Math" charset="0"/>
+                          <a:cs typeface="Cambria Math" charset="0"/>
+                        </a:rPr>
+                        <m:t>𝑤</m:t>
+                      </m:r>
+                    </m:oMath>
+                  </m:oMathPara>
+                </a14:m>
+                <a:endParaRPr lang="en-US" sz="1600" i="1" dirty="0">
+                  <a:latin typeface="Cambria Math" charset="0"/>
+                  <a:ea typeface="Cambria Math" charset="0"/>
+                  <a:cs typeface="Cambria Math" charset="0"/>
+                </a:endParaRPr>
+              </a:p>
+            </p:txBody>
+          </p:sp>
+        </mc:Choice>
+        <mc:Fallback>
+          <p:sp>
+            <p:nvSpPr>
+              <p:cNvPr id="215" name="TextBox 214"/>
+              <p:cNvSpPr txBox="1">
+                <a:spLocks noRot="1" noChangeAspect="1" noMove="1" noResize="1" noEditPoints="1" noAdjustHandles="1" noChangeArrowheads="1" noChangeShapeType="1" noTextEdit="1"/>
+              </p:cNvSpPr>
+              <p:nvPr/>
+            </p:nvSpPr>
+            <p:spPr>
+              <a:xfrm>
+                <a:off x="697737" y="2899376"/>
+                <a:ext cx="387862" cy="338554"/>
+              </a:xfrm>
+              <a:prstGeom prst="rect">
+                <a:avLst/>
+              </a:prstGeom>
+              <a:blipFill rotWithShape="0">
+                <a:blip r:embed="rId4"/>
+                <a:stretch>
+                  <a:fillRect/>
+                </a:stretch>
+              </a:blipFill>
+            </p:spPr>
+            <p:txBody>
+              <a:bodyPr/>
+              <a:lstStyle/>
+              <a:p>
+                <a:r>
+                  <a:rPr lang="en-US">
+                    <a:noFill/>
+                  </a:rPr>
+                  <a:t> </a:t>
+                </a:r>
+              </a:p>
+            </p:txBody>
+          </p:sp>
+        </mc:Fallback>
+      </mc:AlternateContent>
       <p:sp>
         <p:nvSpPr>
-          <p:cNvPr id="255" name="TextBox 254"/>
-          <p:cNvSpPr txBox="1"/>
+          <p:cNvPr id="258" name="Rectangle 257"/>
+          <p:cNvSpPr/>
           <p:nvPr/>
         </p:nvSpPr>
         <p:spPr>
           <a:xfrm>
-            <a:off x="8856708" y="991941"/>
-            <a:ext cx="423514" cy="369332"/>
+            <a:off x="6542227" y="2379886"/>
+            <a:ext cx="145774" cy="145774"/>
           </a:xfrm>
           <a:prstGeom prst="rect">
-            <a:avLst/>
-          </a:prstGeom>
-          <a:noFill/>
-        </p:spPr>
-        <p:txBody>
-          <a:bodyPr wrap="none" rtlCol="0">
-            <a:spAutoFit/>
-          </a:bodyPr>
-          <a:lstStyle/>
-          <a:p>
-            <a:r>
-              <a:rPr lang="en-US" dirty="0"/>
-              <a:t>(c)</a:t>
-            </a:r>
-          </a:p>
-        </p:txBody>
-      </p:sp>
-      <p:sp>
-        <p:nvSpPr>
-          <p:cNvPr id="257" name="Oval 256"/>
-          <p:cNvSpPr/>
-          <p:nvPr/>
-        </p:nvSpPr>
-        <p:spPr>
-          <a:xfrm>
-            <a:off x="10511253" y="2385202"/>
-            <a:ext cx="144394" cy="144394"/>
-          </a:xfrm>
-          <a:prstGeom prst="ellipse">
             <a:avLst/>
           </a:prstGeom>
           <a:noFill/>
@@ -11669,7 +10411,6 @@
               <a:schemeClr val="tx1"/>
             </a:solidFill>
           </a:ln>
-          <a:effectLst/>
         </p:spPr>
         <p:style>
           <a:lnRef idx="2">
@@ -11696,6 +10437,96 @@
           </a:p>
         </p:txBody>
       </p:sp>
+      <mc:AlternateContent xmlns:mc="http://schemas.openxmlformats.org/markup-compatibility/2006">
+        <mc:Choice xmlns:a14="http://schemas.microsoft.com/office/drawing/2010/main" Requires="a14">
+          <p:sp>
+            <p:nvSpPr>
+              <p:cNvPr id="259" name="TextBox 258"/>
+              <p:cNvSpPr txBox="1"/>
+              <p:nvPr/>
+            </p:nvSpPr>
+            <p:spPr>
+              <a:xfrm>
+                <a:off x="6688001" y="2268390"/>
+                <a:ext cx="351763" cy="338554"/>
+              </a:xfrm>
+              <a:prstGeom prst="rect">
+                <a:avLst/>
+              </a:prstGeom>
+              <a:noFill/>
+            </p:spPr>
+            <p:txBody>
+              <a:bodyPr wrap="none" rtlCol="0">
+                <a:spAutoFit/>
+              </a:bodyPr>
+              <a:lstStyle/>
+              <a:p>
+                <a:pPr/>
+                <a14:m>
+                  <m:oMathPara xmlns:m="http://schemas.openxmlformats.org/officeDocument/2006/math">
+                    <m:oMathParaPr>
+                      <m:jc m:val="centerGroup"/>
+                    </m:oMathParaPr>
+                    <m:oMath xmlns:m="http://schemas.openxmlformats.org/officeDocument/2006/math">
+                      <m:r>
+                        <a:rPr lang="en-US" sz="1600" b="0" i="1" smtClean="0">
+                          <a:latin typeface="Cambria Math" charset="0"/>
+                          <a:ea typeface="Cambria Math" charset="0"/>
+                          <a:cs typeface="Cambria Math" charset="0"/>
+                        </a:rPr>
+                        <m:t>𝑢</m:t>
+                      </m:r>
+                    </m:oMath>
+                  </m:oMathPara>
+                </a14:m>
+                <a:endParaRPr lang="en-US" sz="1600" i="1" dirty="0">
+                  <a:latin typeface="Cambria Math" charset="0"/>
+                  <a:ea typeface="Cambria Math" charset="0"/>
+                  <a:cs typeface="Cambria Math" charset="0"/>
+                </a:endParaRPr>
+              </a:p>
+            </p:txBody>
+          </p:sp>
+        </mc:Choice>
+        <mc:Fallback>
+          <p:sp>
+            <p:nvSpPr>
+              <p:cNvPr id="259" name="TextBox 258"/>
+              <p:cNvSpPr txBox="1">
+                <a:spLocks noRot="1" noChangeAspect="1" noMove="1" noResize="1" noEditPoints="1" noAdjustHandles="1" noChangeArrowheads="1" noChangeShapeType="1" noTextEdit="1"/>
+              </p:cNvSpPr>
+              <p:nvPr/>
+            </p:nvSpPr>
+            <p:spPr>
+              <a:xfrm>
+                <a:off x="6688001" y="2268390"/>
+                <a:ext cx="351763" cy="338554"/>
+              </a:xfrm>
+              <a:prstGeom prst="rect">
+                <a:avLst/>
+              </a:prstGeom>
+              <a:blipFill rotWithShape="0">
+                <a:blip r:embed="rId5"/>
+                <a:stretch>
+                  <a:fillRect/>
+                </a:stretch>
+              </a:blipFill>
+            </p:spPr>
+            <p:txBody>
+              <a:bodyPr/>
+              <a:lstStyle/>
+              <a:p>
+                <a:r>
+                  <a:rPr lang="en-US">
+                    <a:noFill/>
+                  </a:rPr>
+                  <a:t> </a:t>
+                </a:r>
+              </a:p>
+            </p:txBody>
+          </p:sp>
+        </mc:Fallback>
+      </mc:AlternateContent>
     </p:spTree>
     <p:extLst>
       <p:ext uri="{BB962C8B-B14F-4D97-AF65-F5344CB8AC3E}">
@@ -39973,6 +38804,186 @@
           </a:p>
         </p:txBody>
       </p:sp>
+      <mc:AlternateContent xmlns:mc="http://schemas.openxmlformats.org/markup-compatibility/2006">
+        <mc:Choice xmlns:a14="http://schemas.microsoft.com/office/drawing/2010/main" Requires="a14">
+          <p:sp>
+            <p:nvSpPr>
+              <p:cNvPr id="44" name="TextBox 43"/>
+              <p:cNvSpPr txBox="1"/>
+              <p:nvPr/>
+            </p:nvSpPr>
+            <p:spPr>
+              <a:xfrm>
+                <a:off x="4317237" y="3686776"/>
+                <a:ext cx="347788" cy="338554"/>
+              </a:xfrm>
+              <a:prstGeom prst="rect">
+                <a:avLst/>
+              </a:prstGeom>
+              <a:noFill/>
+            </p:spPr>
+            <p:txBody>
+              <a:bodyPr wrap="none" rtlCol="0">
+                <a:spAutoFit/>
+              </a:bodyPr>
+              <a:lstStyle/>
+              <a:p>
+                <a:pPr/>
+                <a14:m>
+                  <m:oMathPara xmlns:m="http://schemas.openxmlformats.org/officeDocument/2006/math">
+                    <m:oMathParaPr>
+                      <m:jc m:val="centerGroup"/>
+                    </m:oMathParaPr>
+                    <m:oMath xmlns:m="http://schemas.openxmlformats.org/officeDocument/2006/math">
+                      <m:r>
+                        <a:rPr lang="en-US" sz="1600" b="0" i="1" smtClean="0">
+                          <a:latin typeface="Cambria Math" charset="0"/>
+                          <a:ea typeface="Cambria Math" charset="0"/>
+                          <a:cs typeface="Cambria Math" charset="0"/>
+                        </a:rPr>
+                        <m:t>𝑣</m:t>
+                      </m:r>
+                    </m:oMath>
+                  </m:oMathPara>
+                </a14:m>
+                <a:endParaRPr lang="en-US" sz="1600" i="1" dirty="0">
+                  <a:latin typeface="Cambria Math" charset="0"/>
+                  <a:ea typeface="Cambria Math" charset="0"/>
+                  <a:cs typeface="Cambria Math" charset="0"/>
+                </a:endParaRPr>
+              </a:p>
+            </p:txBody>
+          </p:sp>
+        </mc:Choice>
+        <mc:Fallback>
+          <p:sp>
+            <p:nvSpPr>
+              <p:cNvPr id="44" name="TextBox 43"/>
+              <p:cNvSpPr txBox="1">
+                <a:spLocks noRot="1" noChangeAspect="1" noMove="1" noResize="1" noEditPoints="1" noAdjustHandles="1" noChangeArrowheads="1" noChangeShapeType="1" noTextEdit="1"/>
+              </p:cNvSpPr>
+              <p:nvPr/>
+            </p:nvSpPr>
+            <p:spPr>
+              <a:xfrm>
+                <a:off x="4317237" y="3686776"/>
+                <a:ext cx="347788" cy="338554"/>
+              </a:xfrm>
+              <a:prstGeom prst="rect">
+                <a:avLst/>
+              </a:prstGeom>
+              <a:blipFill rotWithShape="0">
+                <a:blip r:embed="rId3"/>
+                <a:stretch>
+                  <a:fillRect/>
+                </a:stretch>
+              </a:blipFill>
+            </p:spPr>
+            <p:txBody>
+              <a:bodyPr/>
+              <a:lstStyle/>
+              <a:p>
+                <a:r>
+                  <a:rPr lang="en-US">
+                    <a:noFill/>
+                  </a:rPr>
+                  <a:t> </a:t>
+                </a:r>
+              </a:p>
+            </p:txBody>
+          </p:sp>
+        </mc:Fallback>
+      </mc:AlternateContent>
+      <mc:AlternateContent xmlns:mc="http://schemas.openxmlformats.org/markup-compatibility/2006">
+        <mc:Choice xmlns:a14="http://schemas.microsoft.com/office/drawing/2010/main" Requires="a14">
+          <p:sp>
+            <p:nvSpPr>
+              <p:cNvPr id="45" name="TextBox 44"/>
+              <p:cNvSpPr txBox="1"/>
+              <p:nvPr/>
+            </p:nvSpPr>
+            <p:spPr>
+              <a:xfrm>
+                <a:off x="4495037" y="3039076"/>
+                <a:ext cx="387862" cy="338554"/>
+              </a:xfrm>
+              <a:prstGeom prst="rect">
+                <a:avLst/>
+              </a:prstGeom>
+              <a:noFill/>
+            </p:spPr>
+            <p:txBody>
+              <a:bodyPr wrap="none" rtlCol="0">
+                <a:spAutoFit/>
+              </a:bodyPr>
+              <a:lstStyle/>
+              <a:p>
+                <a:pPr/>
+                <a14:m>
+                  <m:oMathPara xmlns:m="http://schemas.openxmlformats.org/officeDocument/2006/math">
+                    <m:oMathParaPr>
+                      <m:jc m:val="centerGroup"/>
+                    </m:oMathParaPr>
+                    <m:oMath xmlns:m="http://schemas.openxmlformats.org/officeDocument/2006/math">
+                      <m:r>
+                        <a:rPr lang="en-US" sz="1600" b="0" i="1" smtClean="0">
+                          <a:latin typeface="Cambria Math" charset="0"/>
+                          <a:ea typeface="Cambria Math" charset="0"/>
+                          <a:cs typeface="Cambria Math" charset="0"/>
+                        </a:rPr>
+                        <m:t>𝑤</m:t>
+                      </m:r>
+                    </m:oMath>
+                  </m:oMathPara>
+                </a14:m>
+                <a:endParaRPr lang="en-US" sz="1600" i="1" dirty="0">
+                  <a:latin typeface="Cambria Math" charset="0"/>
+                  <a:ea typeface="Cambria Math" charset="0"/>
+                  <a:cs typeface="Cambria Math" charset="0"/>
+                </a:endParaRPr>
+              </a:p>
+            </p:txBody>
+          </p:sp>
+        </mc:Choice>
+        <mc:Fallback>
+          <p:sp>
+            <p:nvSpPr>
+              <p:cNvPr id="45" name="TextBox 44"/>
+              <p:cNvSpPr txBox="1">
+                <a:spLocks noRot="1" noChangeAspect="1" noMove="1" noResize="1" noEditPoints="1" noAdjustHandles="1" noChangeArrowheads="1" noChangeShapeType="1" noTextEdit="1"/>
+              </p:cNvSpPr>
+              <p:nvPr/>
+            </p:nvSpPr>
+            <p:spPr>
+              <a:xfrm>
+                <a:off x="4495037" y="3039076"/>
+                <a:ext cx="387862" cy="338554"/>
+              </a:xfrm>
+              <a:prstGeom prst="rect">
+                <a:avLst/>
+              </a:prstGeom>
+              <a:blipFill rotWithShape="0">
+                <a:blip r:embed="rId4"/>
+                <a:stretch>
+                  <a:fillRect/>
+                </a:stretch>
+              </a:blipFill>
+            </p:spPr>
+            <p:txBody>
+              <a:bodyPr/>
+              <a:lstStyle/>
+              <a:p>
+                <a:r>
+                  <a:rPr lang="en-US">
+                    <a:noFill/>
+                  </a:rPr>
+                  <a:t> </a:t>
+                </a:r>
+              </a:p>
+            </p:txBody>
+          </p:sp>
+        </mc:Fallback>
+      </mc:AlternateContent>
     </p:spTree>
     <p:extLst>
       <p:ext uri="{BB962C8B-B14F-4D97-AF65-F5344CB8AC3E}">
@@ -42927,8 +41938,8 @@
               </a:p>
             </p:txBody>
           </p:sp>
-          <mc:AlternateContent xmlns:mc="http://schemas.openxmlformats.org/markup-compatibility/2006">
-            <mc:Choice xmlns:a14="http://schemas.microsoft.com/office/drawing/2010/main" Requires="a14">
+          <mc:AlternateContent xmlns:mc="http://schemas.openxmlformats.org/markup-compatibility/2006" xmlns:a14="http://schemas.microsoft.com/office/drawing/2010/main">
+            <mc:Choice Requires="a14">
               <p:sp>
                 <p:nvSpPr>
                   <p:cNvPr id="102" name="TextBox 101"/>
@@ -42995,7 +42006,7 @@
                 </p:txBody>
               </p:sp>
             </mc:Choice>
-            <mc:Fallback>
+            <mc:Fallback xmlns="">
               <p:sp>
                 <p:nvSpPr>
                   <p:cNvPr id="102" name="TextBox 101"/>
@@ -43034,8 +42045,8 @@
               </p:sp>
             </mc:Fallback>
           </mc:AlternateContent>
-          <mc:AlternateContent xmlns:mc="http://schemas.openxmlformats.org/markup-compatibility/2006">
-            <mc:Choice xmlns:a14="http://schemas.microsoft.com/office/drawing/2010/main" Requires="a14">
+          <mc:AlternateContent xmlns:mc="http://schemas.openxmlformats.org/markup-compatibility/2006" xmlns:a14="http://schemas.microsoft.com/office/drawing/2010/main">
+            <mc:Choice Requires="a14">
               <p:sp>
                 <p:nvSpPr>
                   <p:cNvPr id="137" name="TextBox 136"/>
@@ -43086,13 +42097,7 @@
                                 <a:rPr lang="en-US" sz="1600" b="0" i="1" smtClean="0">
                                   <a:latin typeface="Cambria Math" charset="0"/>
                                 </a:rPr>
-                                <m:t>𝐶</m:t>
-                              </m:r>
-                              <m:r>
-                                <a:rPr lang="en-US" sz="1600" b="0" i="1" smtClean="0">
-                                  <a:latin typeface="Cambria Math" charset="0"/>
-                                </a:rPr>
-                                <m:t>𝑢</m:t>
+                                <m:t>𝐶𝑢</m:t>
                               </m:r>
                             </m:sub>
                           </m:sSub>
@@ -43108,7 +42113,7 @@
                 </p:txBody>
               </p:sp>
             </mc:Choice>
-            <mc:Fallback>
+            <mc:Fallback xmlns="">
               <p:sp>
                 <p:nvSpPr>
                   <p:cNvPr id="137" name="TextBox 136"/>
@@ -43157,8 +42162,8 @@
                 </p:nvSpPr>
                 <p:spPr>
                   <a:xfrm>
-                    <a:off x="8362489" y="4637272"/>
-                    <a:ext cx="737894" cy="338554"/>
+                    <a:off x="8552989" y="4802372"/>
+                    <a:ext cx="351763" cy="338554"/>
                   </a:xfrm>
                   <a:prstGeom prst="rect">
                     <a:avLst/>
@@ -43184,18 +42189,6 @@
                             </a:rPr>
                             <m:t>𝑢</m:t>
                           </m:r>
-                          <m:r>
-                            <a:rPr lang="en-US" sz="1600" b="0" i="1" smtClean="0">
-                              <a:latin typeface="Cambria Math" charset="0"/>
-                            </a:rPr>
-                            <m:t>=</m:t>
-                          </m:r>
-                          <m:r>
-                            <a:rPr lang="en-US" sz="1600" b="0" i="1" smtClean="0">
-                              <a:latin typeface="Cambria Math" charset="0"/>
-                            </a:rPr>
-                            <m:t>𝑣</m:t>
-                          </m:r>
                         </m:oMath>
                       </m:oMathPara>
                     </a14:m>
@@ -43219,8 +42212,8 @@
                 </p:nvSpPr>
                 <p:spPr>
                   <a:xfrm>
-                    <a:off x="8362489" y="4637272"/>
-                    <a:ext cx="737894" cy="338554"/>
+                    <a:off x="8552989" y="4802372"/>
+                    <a:ext cx="351763" cy="338554"/>
                   </a:xfrm>
                   <a:prstGeom prst="rect">
                     <a:avLst/>

</xml_diff>